<commit_message>
Updated version of NTAC outbrief to NBAC to what Mike Hulme sent out most recently.
</commit_message>
<xml_diff>
--- a/2020-ntac-annual-meeting/NTAC Outbrief to NBAC.pptx
+++ b/2020-ntac-annual-meeting/NTAC Outbrief to NBAC.pptx
@@ -5,21 +5,22 @@
     <p:sldMasterId id="2147483648" r:id="rId1"/>
   </p:sldMasterIdLst>
   <p:notesMasterIdLst>
-    <p:notesMasterId r:id="rId14"/>
+    <p:notesMasterId r:id="rId15"/>
   </p:notesMasterIdLst>
   <p:sldIdLst>
     <p:sldId id="256" r:id="rId2"/>
-    <p:sldId id="263" r:id="rId3"/>
-    <p:sldId id="264" r:id="rId4"/>
-    <p:sldId id="265" r:id="rId5"/>
-    <p:sldId id="267" r:id="rId6"/>
-    <p:sldId id="273" r:id="rId7"/>
-    <p:sldId id="274" r:id="rId8"/>
-    <p:sldId id="275" r:id="rId9"/>
-    <p:sldId id="266" r:id="rId10"/>
-    <p:sldId id="270" r:id="rId11"/>
-    <p:sldId id="271" r:id="rId12"/>
-    <p:sldId id="272" r:id="rId13"/>
+    <p:sldId id="276" r:id="rId3"/>
+    <p:sldId id="263" r:id="rId4"/>
+    <p:sldId id="264" r:id="rId5"/>
+    <p:sldId id="265" r:id="rId6"/>
+    <p:sldId id="267" r:id="rId7"/>
+    <p:sldId id="273" r:id="rId8"/>
+    <p:sldId id="274" r:id="rId9"/>
+    <p:sldId id="275" r:id="rId10"/>
+    <p:sldId id="266" r:id="rId11"/>
+    <p:sldId id="270" r:id="rId12"/>
+    <p:sldId id="271" r:id="rId13"/>
+    <p:sldId id="272" r:id="rId14"/>
   </p:sldIdLst>
   <p:sldSz cx="12192000" cy="6858000"/>
   <p:notesSz cx="6858000" cy="9144000"/>
@@ -3916,7 +3917,7 @@
           <p:cNvPr id="2" name="Title 1">
             <a:extLst>
               <a:ext uri="{FF2B5EF4-FFF2-40B4-BE49-F238E27FC236}">
-                <a16:creationId xmlns:a16="http://schemas.microsoft.com/office/drawing/2014/main" id="{0E4A0875-B42A-43A1-8638-C9F39616B784}"/>
+                <a16:creationId xmlns:a16="http://schemas.microsoft.com/office/drawing/2014/main" id="{3CFEFFB5-E2DC-4CBF-9EF5-1ABAC30E3E1B}"/>
               </a:ext>
             </a:extLst>
           </p:cNvPr>
@@ -3934,22 +3935,17 @@
           <a:p>
             <a:r>
               <a:rPr lang="en-US" dirty="0"/>
-              <a:t>Completed</a:t>
-            </a:r>
-            <a:r>
-              <a:rPr lang="en-US" baseline="0" dirty="0"/>
-              <a:t> efforts and next steps</a:t>
-            </a:r>
-            <a:endParaRPr lang="en-US" dirty="0"/>
+              <a:t>NIEM models</a:t>
+            </a:r>
           </a:p>
         </p:txBody>
       </p:sp>
       <p:sp>
         <p:nvSpPr>
-          <p:cNvPr id="4" name="Content Placeholder 3">
+          <p:cNvPr id="3" name="Slide Number Placeholder 2">
             <a:extLst>
               <a:ext uri="{FF2B5EF4-FFF2-40B4-BE49-F238E27FC236}">
-                <a16:creationId xmlns:a16="http://schemas.microsoft.com/office/drawing/2014/main" id="{2B9F8DC0-1E12-488E-ACE8-9D62FDC02858}"/>
+                <a16:creationId xmlns:a16="http://schemas.microsoft.com/office/drawing/2014/main" id="{4CCC5493-7930-4174-A6FD-56225EDF1130}"/>
               </a:ext>
             </a:extLst>
           </p:cNvPr>
@@ -3957,7 +3953,36 @@
             <a:spLocks noGrp="1"/>
           </p:cNvSpPr>
           <p:nvPr>
-            <p:ph idx="1"/>
+            <p:ph type="sldNum" sz="quarter" idx="12"/>
+          </p:nvPr>
+        </p:nvSpPr>
+        <p:spPr/>
+        <p:txBody>
+          <a:bodyPr/>
+          <a:lstStyle/>
+          <a:p>
+            <a:fld id="{D9011FF2-DFD3-6445-BBA2-CB95B68222FB}" type="slidenum">
+              <a:rPr lang="en-US" smtClean="0"/>
+              <a:t>10</a:t>
+            </a:fld>
+            <a:endParaRPr lang="en-US"/>
+          </a:p>
+        </p:txBody>
+      </p:sp>
+      <p:sp>
+        <p:nvSpPr>
+          <p:cNvPr id="4" name="Text Placeholder 3">
+            <a:extLst>
+              <a:ext uri="{FF2B5EF4-FFF2-40B4-BE49-F238E27FC236}">
+                <a16:creationId xmlns:a16="http://schemas.microsoft.com/office/drawing/2014/main" id="{FDC0569A-C340-4AC1-ADA6-F9A19389591B}"/>
+              </a:ext>
+            </a:extLst>
+          </p:cNvPr>
+          <p:cNvSpPr>
+            <a:spLocks noGrp="1"/>
+          </p:cNvSpPr>
+          <p:nvPr>
+            <p:ph type="body" idx="4294967295"/>
           </p:nvPr>
         </p:nvSpPr>
         <p:spPr>
@@ -3967,146 +3992,119 @@
           </a:xfrm>
         </p:spPr>
         <p:txBody>
-          <a:bodyPr/>
+          <a:bodyPr>
+            <a:normAutofit lnSpcReduction="10000"/>
+          </a:bodyPr>
           <a:lstStyle/>
           <a:p>
+            <a:pPr rtl="0" eaLnBrk="1" latinLnBrk="0" hangingPunct="1"/>
+            <a:r>
+              <a:rPr lang="en-US" sz="2800" kern="1200" dirty="0">
+                <a:solidFill>
+                  <a:schemeClr val="tx1"/>
+                </a:solidFill>
+                <a:effectLst/>
+                <a:latin typeface="+mn-lt"/>
+                <a:ea typeface="+mn-ea"/>
+                <a:cs typeface="+mn-cs"/>
+              </a:rPr>
+              <a:t>Goals</a:t>
+            </a:r>
+          </a:p>
+          <a:p>
+            <a:pPr lvl="1"/>
+            <a:r>
+              <a:rPr lang="en-US" kern="1200" dirty="0">
+                <a:solidFill>
+                  <a:schemeClr val="tx1"/>
+                </a:solidFill>
+                <a:effectLst/>
+                <a:latin typeface="+mn-lt"/>
+                <a:ea typeface="+mn-ea"/>
+                <a:cs typeface="+mn-cs"/>
+              </a:rPr>
+              <a:t>Get to OpenAPI/JSON capabilities – not just an academic exercise</a:t>
+            </a:r>
+            <a:endParaRPr lang="en-US" dirty="0">
+              <a:effectLst/>
+            </a:endParaRPr>
+          </a:p>
+          <a:p>
+            <a:pPr lvl="1"/>
+            <a:r>
+              <a:rPr lang="en-US" kern="1200" dirty="0">
+                <a:solidFill>
+                  <a:schemeClr val="tx1"/>
+                </a:solidFill>
+                <a:effectLst/>
+                <a:latin typeface="+mn-lt"/>
+                <a:ea typeface="+mn-ea"/>
+                <a:cs typeface="+mn-cs"/>
+              </a:rPr>
+              <a:t>At the center of an interoperable tool strategy</a:t>
+            </a:r>
+          </a:p>
+          <a:p>
+            <a:pPr lvl="1"/>
+            <a:r>
+              <a:rPr lang="en-US" dirty="0">
+                <a:effectLst/>
+              </a:rPr>
+              <a:t>Improve automation</a:t>
+            </a:r>
+          </a:p>
+          <a:p>
             <a:r>
               <a:rPr lang="en-US" dirty="0"/>
-              <a:t>Completed tasks</a:t>
+              <a:t>NTAC is developing a representation for NIEM models represented as NIEM data</a:t>
             </a:r>
           </a:p>
           <a:p>
             <a:pPr lvl="1"/>
             <a:r>
               <a:rPr lang="en-US" dirty="0"/>
-              <a:t>Most of the metamodel is defined</a:t>
+              <a:t>A NIEM model could be XML, JSON, or possibly other future formats</a:t>
+            </a:r>
+          </a:p>
+          <a:p>
+            <a:r>
+              <a:rPr lang="en-US" dirty="0"/>
+              <a:t>NIEM models would be transformed into conformant XML schema, JSON schema, UML, documentation, etc.</a:t>
             </a:r>
           </a:p>
           <a:p>
             <a:pPr lvl="1"/>
             <a:r>
               <a:rPr lang="en-US" dirty="0"/>
-              <a:t>Most of NIEM can be defined in this format</a:t>
-            </a:r>
-          </a:p>
-          <a:p>
+              <a:t>A model is more abstract than XML schema</a:t>
+            </a:r>
+          </a:p>
+          <a:p>
+            <a:pPr lvl="1"/>
             <a:r>
               <a:rPr lang="en-US" dirty="0"/>
-              <a:t>To do</a:t>
+              <a:t>That abstract form in then transformed into XML schema, JSON, or whatever you need</a:t>
+            </a:r>
+          </a:p>
+          <a:p>
+            <a:r>
+              <a:rPr lang="en-US" dirty="0"/>
+              <a:t>There is an infrastructure piece that lets all this work – that’s the “metamodel”</a:t>
             </a:r>
           </a:p>
           <a:p>
             <a:pPr lvl="1"/>
             <a:r>
               <a:rPr lang="en-US" dirty="0"/>
-              <a:t>Review work done so far</a:t>
-            </a:r>
-          </a:p>
-          <a:p>
-            <a:pPr lvl="1"/>
-            <a:r>
-              <a:rPr lang="en-US" dirty="0"/>
-              <a:t>Define few remaining parts of metamodel</a:t>
-            </a:r>
-          </a:p>
-          <a:p>
-            <a:pPr lvl="1"/>
-            <a:r>
-              <a:rPr lang="en-US" dirty="0"/>
-              <a:t>Write transformations modules for testing</a:t>
-            </a:r>
-          </a:p>
-          <a:p>
-            <a:pPr lvl="2"/>
-            <a:r>
-              <a:rPr lang="en-US" dirty="0" err="1"/>
-              <a:t>Model</a:t>
-            </a:r>
-            <a:r>
-              <a:rPr lang="en-US" dirty="0" err="1">
-                <a:sym typeface="Wingdings" panose="05000000000000000000" pitchFamily="2" charset="2"/>
-              </a:rPr>
-              <a:t>JSON</a:t>
-            </a:r>
-            <a:r>
-              <a:rPr lang="en-US" dirty="0">
-                <a:sym typeface="Wingdings" panose="05000000000000000000" pitchFamily="2" charset="2"/>
-              </a:rPr>
-              <a:t> schema</a:t>
-            </a:r>
-          </a:p>
-          <a:p>
-            <a:pPr lvl="2"/>
-            <a:r>
-              <a:rPr lang="en-US" dirty="0">
-                <a:sym typeface="Wingdings" panose="05000000000000000000" pitchFamily="2" charset="2"/>
-              </a:rPr>
-              <a:t>XML </a:t>
-            </a:r>
-            <a:r>
-              <a:rPr lang="en-US" dirty="0" err="1">
-                <a:sym typeface="Wingdings" panose="05000000000000000000" pitchFamily="2" charset="2"/>
-              </a:rPr>
-              <a:t>schemamodel</a:t>
-            </a:r>
-            <a:endParaRPr lang="en-US" dirty="0">
-              <a:sym typeface="Wingdings" panose="05000000000000000000" pitchFamily="2" charset="2"/>
-            </a:endParaRPr>
-          </a:p>
-          <a:p>
-            <a:pPr lvl="2"/>
-            <a:r>
-              <a:rPr lang="en-US" dirty="0" err="1">
-                <a:sym typeface="Wingdings" panose="05000000000000000000" pitchFamily="2" charset="2"/>
-              </a:rPr>
-              <a:t>ModelUML</a:t>
-            </a:r>
-            <a:r>
-              <a:rPr lang="en-US" dirty="0">
-                <a:sym typeface="Wingdings" panose="05000000000000000000" pitchFamily="2" charset="2"/>
-              </a:rPr>
-              <a:t> (as XMI)</a:t>
-            </a:r>
-            <a:r>
-              <a:rPr lang="en-US" dirty="0"/>
-              <a:t> </a:t>
-            </a:r>
-          </a:p>
-        </p:txBody>
-      </p:sp>
-      <p:sp>
-        <p:nvSpPr>
-          <p:cNvPr id="3" name="Slide Number Placeholder 2">
-            <a:extLst>
-              <a:ext uri="{FF2B5EF4-FFF2-40B4-BE49-F238E27FC236}">
-                <a16:creationId xmlns:a16="http://schemas.microsoft.com/office/drawing/2014/main" id="{83B57B50-FF63-498D-A52A-ADC3B0F0A0CA}"/>
-              </a:ext>
-            </a:extLst>
-          </p:cNvPr>
-          <p:cNvSpPr>
-            <a:spLocks noGrp="1"/>
-          </p:cNvSpPr>
-          <p:nvPr>
-            <p:ph type="sldNum" sz="quarter" idx="12"/>
-          </p:nvPr>
-        </p:nvSpPr>
-        <p:spPr/>
-        <p:txBody>
-          <a:bodyPr/>
-          <a:lstStyle/>
-          <a:p>
-            <a:fld id="{D9011FF2-DFD3-6445-BBA2-CB95B68222FB}" type="slidenum">
-              <a:rPr lang="en-US" smtClean="0"/>
-              <a:t>10</a:t>
-            </a:fld>
-            <a:endParaRPr lang="en-US"/>
+              <a:t>A “metamodel” is a model for models</a:t>
+            </a:r>
           </a:p>
         </p:txBody>
       </p:sp>
     </p:spTree>
     <p:extLst>
       <p:ext uri="{BB962C8B-B14F-4D97-AF65-F5344CB8AC3E}">
-        <p14:creationId xmlns:p14="http://schemas.microsoft.com/office/powerpoint/2010/main" val="1305426205"/>
+        <p14:creationId xmlns:p14="http://schemas.microsoft.com/office/powerpoint/2010/main" val="3278332417"/>
       </p:ext>
     </p:extLst>
   </p:cSld>
@@ -4138,7 +4136,7 @@
           <p:cNvPr id="2" name="Title 1">
             <a:extLst>
               <a:ext uri="{FF2B5EF4-FFF2-40B4-BE49-F238E27FC236}">
-                <a16:creationId xmlns:a16="http://schemas.microsoft.com/office/drawing/2014/main" id="{7B4A580F-F67A-48BD-8A44-56B48BD6B9E4}"/>
+                <a16:creationId xmlns:a16="http://schemas.microsoft.com/office/drawing/2014/main" id="{0E4A0875-B42A-43A1-8638-C9F39616B784}"/>
               </a:ext>
             </a:extLst>
           </p:cNvPr>
@@ -4154,14 +4152,13 @@
           <a:bodyPr/>
           <a:lstStyle/>
           <a:p>
-            <a:pPr lvl="0"/>
             <a:r>
               <a:rPr lang="en-US" dirty="0"/>
-              <a:t>Other topics</a:t>
+              <a:t>Completed</a:t>
             </a:r>
             <a:r>
               <a:rPr lang="en-US" baseline="0" dirty="0"/>
-              <a:t> we discussed</a:t>
+              <a:t> efforts and next steps</a:t>
             </a:r>
             <a:endParaRPr lang="en-US" dirty="0"/>
           </a:p>
@@ -4169,10 +4166,10 @@
       </p:sp>
       <p:sp>
         <p:nvSpPr>
-          <p:cNvPr id="3" name="Content Placeholder 2">
+          <p:cNvPr id="4" name="Content Placeholder 3">
             <a:extLst>
               <a:ext uri="{FF2B5EF4-FFF2-40B4-BE49-F238E27FC236}">
-                <a16:creationId xmlns:a16="http://schemas.microsoft.com/office/drawing/2014/main" id="{D76AC0A2-D410-47B6-837B-35B10271480D}"/>
+                <a16:creationId xmlns:a16="http://schemas.microsoft.com/office/drawing/2014/main" id="{2B9F8DC0-1E12-488E-ACE8-9D62FDC02858}"/>
               </a:ext>
             </a:extLst>
           </p:cNvPr>
@@ -4195,27 +4192,111 @@
           <a:p>
             <a:r>
               <a:rPr lang="en-US" dirty="0"/>
-              <a:t>Registry/Repository</a:t>
-            </a:r>
-            <a:r>
-              <a:rPr lang="en-US" baseline="0" dirty="0"/>
-              <a:t> – discussed status of effort</a:t>
-            </a:r>
-          </a:p>
-          <a:p>
-            <a:r>
-              <a:rPr lang="en-US" baseline="0" dirty="0"/>
-              <a:t>Becoming a standards organization (discussion tomorrow)</a:t>
-            </a:r>
+              <a:t>Completed tasks</a:t>
+            </a:r>
+          </a:p>
+          <a:p>
+            <a:pPr lvl="1"/>
+            <a:r>
+              <a:rPr lang="en-US" dirty="0"/>
+              <a:t>Most of the metamodel is defined</a:t>
+            </a:r>
+          </a:p>
+          <a:p>
+            <a:pPr lvl="1"/>
+            <a:r>
+              <a:rPr lang="en-US" dirty="0"/>
+              <a:t>Most of NIEM can be defined in this format</a:t>
+            </a:r>
+          </a:p>
+          <a:p>
+            <a:r>
+              <a:rPr lang="en-US" dirty="0"/>
+              <a:t>To do</a:t>
+            </a:r>
+          </a:p>
+          <a:p>
+            <a:pPr lvl="1"/>
+            <a:r>
+              <a:rPr lang="en-US" dirty="0"/>
+              <a:t>Review work done so far</a:t>
+            </a:r>
+          </a:p>
+          <a:p>
+            <a:pPr lvl="1"/>
+            <a:r>
+              <a:rPr lang="en-US" dirty="0"/>
+              <a:t>Define few remaining parts of metamodel</a:t>
+            </a:r>
+          </a:p>
+          <a:p>
+            <a:pPr lvl="1"/>
+            <a:r>
+              <a:rPr lang="en-US" dirty="0"/>
+              <a:t>Write transformations modules for testing</a:t>
+            </a:r>
+          </a:p>
+          <a:p>
+            <a:pPr lvl="2"/>
+            <a:r>
+              <a:rPr lang="en-US" dirty="0" err="1"/>
+              <a:t>Model</a:t>
+            </a:r>
+            <a:r>
+              <a:rPr lang="en-US" dirty="0" err="1">
+                <a:sym typeface="Wingdings" panose="05000000000000000000" pitchFamily="2" charset="2"/>
+              </a:rPr>
+              <a:t>JSON</a:t>
+            </a:r>
+            <a:r>
+              <a:rPr lang="en-US" dirty="0">
+                <a:sym typeface="Wingdings" panose="05000000000000000000" pitchFamily="2" charset="2"/>
+              </a:rPr>
+              <a:t> schema</a:t>
+            </a:r>
+          </a:p>
+          <a:p>
+            <a:pPr lvl="2"/>
+            <a:r>
+              <a:rPr lang="en-US" dirty="0">
+                <a:sym typeface="Wingdings" panose="05000000000000000000" pitchFamily="2" charset="2"/>
+              </a:rPr>
+              <a:t>XML </a:t>
+            </a:r>
+            <a:r>
+              <a:rPr lang="en-US" dirty="0" err="1">
+                <a:sym typeface="Wingdings" panose="05000000000000000000" pitchFamily="2" charset="2"/>
+              </a:rPr>
+              <a:t>schemamodel</a:t>
+            </a:r>
+            <a:endParaRPr lang="en-US" dirty="0">
+              <a:sym typeface="Wingdings" panose="05000000000000000000" pitchFamily="2" charset="2"/>
+            </a:endParaRPr>
+          </a:p>
+          <a:p>
+            <a:pPr lvl="2"/>
+            <a:r>
+              <a:rPr lang="en-US" dirty="0" err="1">
+                <a:sym typeface="Wingdings" panose="05000000000000000000" pitchFamily="2" charset="2"/>
+              </a:rPr>
+              <a:t>ModelUML</a:t>
+            </a:r>
+            <a:r>
+              <a:rPr lang="en-US" dirty="0">
+                <a:sym typeface="Wingdings" panose="05000000000000000000" pitchFamily="2" charset="2"/>
+              </a:rPr>
+              <a:t> (as XMI)</a:t>
+            </a:r>
+            <a:endParaRPr lang="en-US" dirty="0"/>
           </a:p>
         </p:txBody>
       </p:sp>
       <p:sp>
         <p:nvSpPr>
-          <p:cNvPr id="4" name="Slide Number Placeholder 3">
+          <p:cNvPr id="3" name="Slide Number Placeholder 2">
             <a:extLst>
               <a:ext uri="{FF2B5EF4-FFF2-40B4-BE49-F238E27FC236}">
-                <a16:creationId xmlns:a16="http://schemas.microsoft.com/office/drawing/2014/main" id="{BE523E80-8481-4B44-8A6A-F76DF0A2C6A7}"/>
+                <a16:creationId xmlns:a16="http://schemas.microsoft.com/office/drawing/2014/main" id="{83B57B50-FF63-498D-A52A-ADC3B0F0A0CA}"/>
               </a:ext>
             </a:extLst>
           </p:cNvPr>
@@ -4242,7 +4323,7 @@
     </p:spTree>
     <p:extLst>
       <p:ext uri="{BB962C8B-B14F-4D97-AF65-F5344CB8AC3E}">
-        <p14:creationId xmlns:p14="http://schemas.microsoft.com/office/powerpoint/2010/main" val="2394179447"/>
+        <p14:creationId xmlns:p14="http://schemas.microsoft.com/office/powerpoint/2010/main" val="1305426205"/>
       </p:ext>
     </p:extLst>
   </p:cSld>
@@ -4274,6 +4355,142 @@
           <p:cNvPr id="2" name="Title 1">
             <a:extLst>
               <a:ext uri="{FF2B5EF4-FFF2-40B4-BE49-F238E27FC236}">
+                <a16:creationId xmlns:a16="http://schemas.microsoft.com/office/drawing/2014/main" id="{7B4A580F-F67A-48BD-8A44-56B48BD6B9E4}"/>
+              </a:ext>
+            </a:extLst>
+          </p:cNvPr>
+          <p:cNvSpPr>
+            <a:spLocks noGrp="1"/>
+          </p:cNvSpPr>
+          <p:nvPr>
+            <p:ph type="title"/>
+          </p:nvPr>
+        </p:nvSpPr>
+        <p:spPr/>
+        <p:txBody>
+          <a:bodyPr/>
+          <a:lstStyle/>
+          <a:p>
+            <a:pPr lvl="0"/>
+            <a:r>
+              <a:rPr lang="en-US" dirty="0"/>
+              <a:t>Other topics</a:t>
+            </a:r>
+            <a:r>
+              <a:rPr lang="en-US" baseline="0" dirty="0"/>
+              <a:t> we discussed</a:t>
+            </a:r>
+            <a:endParaRPr lang="en-US" dirty="0"/>
+          </a:p>
+        </p:txBody>
+      </p:sp>
+      <p:sp>
+        <p:nvSpPr>
+          <p:cNvPr id="3" name="Content Placeholder 2">
+            <a:extLst>
+              <a:ext uri="{FF2B5EF4-FFF2-40B4-BE49-F238E27FC236}">
+                <a16:creationId xmlns:a16="http://schemas.microsoft.com/office/drawing/2014/main" id="{D76AC0A2-D410-47B6-837B-35B10271480D}"/>
+              </a:ext>
+            </a:extLst>
+          </p:cNvPr>
+          <p:cNvSpPr>
+            <a:spLocks noGrp="1"/>
+          </p:cNvSpPr>
+          <p:nvPr>
+            <p:ph idx="1"/>
+          </p:nvPr>
+        </p:nvSpPr>
+        <p:spPr>
+          <a:xfrm>
+            <a:off x="213756" y="1258784"/>
+            <a:ext cx="11780322" cy="5330296"/>
+          </a:xfrm>
+        </p:spPr>
+        <p:txBody>
+          <a:bodyPr/>
+          <a:lstStyle/>
+          <a:p>
+            <a:r>
+              <a:rPr lang="en-US" dirty="0"/>
+              <a:t>Registry/Repository</a:t>
+            </a:r>
+            <a:r>
+              <a:rPr lang="en-US" baseline="0" dirty="0"/>
+              <a:t> – discussed status of effort</a:t>
+            </a:r>
+          </a:p>
+          <a:p>
+            <a:r>
+              <a:rPr lang="en-US" baseline="0" dirty="0"/>
+              <a:t>Becoming a standards organization (discussion tomorrow)</a:t>
+            </a:r>
+          </a:p>
+        </p:txBody>
+      </p:sp>
+      <p:sp>
+        <p:nvSpPr>
+          <p:cNvPr id="4" name="Slide Number Placeholder 3">
+            <a:extLst>
+              <a:ext uri="{FF2B5EF4-FFF2-40B4-BE49-F238E27FC236}">
+                <a16:creationId xmlns:a16="http://schemas.microsoft.com/office/drawing/2014/main" id="{BE523E80-8481-4B44-8A6A-F76DF0A2C6A7}"/>
+              </a:ext>
+            </a:extLst>
+          </p:cNvPr>
+          <p:cNvSpPr>
+            <a:spLocks noGrp="1"/>
+          </p:cNvSpPr>
+          <p:nvPr>
+            <p:ph type="sldNum" sz="quarter" idx="12"/>
+          </p:nvPr>
+        </p:nvSpPr>
+        <p:spPr/>
+        <p:txBody>
+          <a:bodyPr/>
+          <a:lstStyle/>
+          <a:p>
+            <a:fld id="{D9011FF2-DFD3-6445-BBA2-CB95B68222FB}" type="slidenum">
+              <a:rPr lang="en-US" smtClean="0"/>
+              <a:t>12</a:t>
+            </a:fld>
+            <a:endParaRPr lang="en-US"/>
+          </a:p>
+        </p:txBody>
+      </p:sp>
+    </p:spTree>
+    <p:extLst>
+      <p:ext uri="{BB962C8B-B14F-4D97-AF65-F5344CB8AC3E}">
+        <p14:creationId xmlns:p14="http://schemas.microsoft.com/office/powerpoint/2010/main" val="2394179447"/>
+      </p:ext>
+    </p:extLst>
+  </p:cSld>
+  <p:clrMapOvr>
+    <a:masterClrMapping/>
+  </p:clrMapOvr>
+</p:sld>
+</file>
+
+<file path=ppt/slides/slide13.xml><?xml version="1.0" encoding="utf-8"?>
+<p:sld xmlns:a="http://schemas.openxmlformats.org/drawingml/2006/main" xmlns:r="http://schemas.openxmlformats.org/officeDocument/2006/relationships" xmlns:p="http://schemas.openxmlformats.org/presentationml/2006/main">
+  <p:cSld>
+    <p:spTree>
+      <p:nvGrpSpPr>
+        <p:cNvPr id="1" name=""/>
+        <p:cNvGrpSpPr/>
+        <p:nvPr/>
+      </p:nvGrpSpPr>
+      <p:grpSpPr>
+        <a:xfrm>
+          <a:off x="0" y="0"/>
+          <a:ext cx="0" cy="0"/>
+          <a:chOff x="0" y="0"/>
+          <a:chExt cx="0" cy="0"/>
+        </a:xfrm>
+      </p:grpSpPr>
+      <p:sp>
+        <p:nvSpPr>
+          <p:cNvPr id="2" name="Title 1">
+            <a:extLst>
+              <a:ext uri="{FF2B5EF4-FFF2-40B4-BE49-F238E27FC236}">
                 <a16:creationId xmlns:a16="http://schemas.microsoft.com/office/drawing/2014/main" id="{1C066ACA-F663-45C6-8C33-428FF3235CCC}"/>
               </a:ext>
             </a:extLst>
@@ -4292,7 +4509,7 @@
           <a:p>
             <a:r>
               <a:rPr lang="en-US" dirty="0"/>
-              <a:t>NTAC-NBAC Interaction</a:t>
+              <a:t>NTAC-NBAC Interactions</a:t>
             </a:r>
           </a:p>
         </p:txBody>
@@ -4320,12 +4537,14 @@
           </a:xfrm>
         </p:spPr>
         <p:txBody>
-          <a:bodyPr/>
+          <a:bodyPr>
+            <a:normAutofit lnSpcReduction="10000"/>
+          </a:bodyPr>
           <a:lstStyle/>
           <a:p>
             <a:r>
               <a:rPr lang="en-US" dirty="0"/>
-              <a:t>What does NTAC see as the hard parts, where technical architecture interferes with or doesn’t support the business</a:t>
+              <a:t>What does NBAC see as the hard parts, where technical architecture interferes with or doesn’t support the business</a:t>
             </a:r>
           </a:p>
           <a:p>
@@ -4350,6 +4569,26 @@
             <a:r>
               <a:rPr lang="en-US" dirty="0"/>
               <a:t>Diverse uses of NIEM data models</a:t>
+            </a:r>
+          </a:p>
+          <a:p>
+            <a:r>
+              <a:rPr lang="en-US" dirty="0"/>
+              <a:t>Future:</a:t>
+            </a:r>
+          </a:p>
+          <a:p>
+            <a:pPr lvl="1"/>
+            <a:r>
+              <a:rPr lang="en-US" dirty="0"/>
+              <a:t>Changes in terminology discussion</a:t>
+            </a:r>
+          </a:p>
+          <a:p>
+            <a:pPr lvl="1"/>
+            <a:r>
+              <a:rPr lang="en-US" dirty="0"/>
+              <a:t>Will work to provide IEPDs and other NIEM data model examples</a:t>
             </a:r>
           </a:p>
         </p:txBody>
@@ -4377,7 +4616,7 @@
           <a:p>
             <a:fld id="{D9011FF2-DFD3-6445-BBA2-CB95B68222FB}" type="slidenum">
               <a:rPr lang="en-US" smtClean="0"/>
-              <a:t>12</a:t>
+              <a:t>13</a:t>
             </a:fld>
             <a:endParaRPr lang="en-US"/>
           </a:p>
@@ -4418,7 +4657,7 @@
           <p:cNvPr id="2" name="Title 1">
             <a:extLst>
               <a:ext uri="{FF2B5EF4-FFF2-40B4-BE49-F238E27FC236}">
-                <a16:creationId xmlns:a16="http://schemas.microsoft.com/office/drawing/2014/main" id="{CCA4D90B-6B9F-4216-A760-603A01DCCE74}"/>
+                <a16:creationId xmlns:a16="http://schemas.microsoft.com/office/drawing/2014/main" id="{5F4D4512-7E8F-4E03-B13B-226824EFD499}"/>
               </a:ext>
             </a:extLst>
           </p:cNvPr>
@@ -4435,56 +4674,18 @@
           <a:lstStyle/>
           <a:p>
             <a:r>
-              <a:rPr lang="en-US" sz="4400" kern="1200" dirty="0">
-                <a:solidFill>
-                  <a:schemeClr val="tx1"/>
-                </a:solidFill>
-                <a:effectLst/>
-                <a:latin typeface="+mj-lt"/>
-                <a:ea typeface="+mj-ea"/>
-                <a:cs typeface="+mj-cs"/>
-              </a:rPr>
-              <a:t>NIEM 5.0 Status</a:t>
-            </a:r>
-            <a:endParaRPr lang="en-US" dirty="0"/>
+              <a:rPr lang="en-US" dirty="0"/>
+              <a:t>Topics</a:t>
+            </a:r>
           </a:p>
         </p:txBody>
       </p:sp>
       <p:sp>
         <p:nvSpPr>
-          <p:cNvPr id="4" name="Slide Number Placeholder 3">
+          <p:cNvPr id="3" name="Content Placeholder 2">
             <a:extLst>
               <a:ext uri="{FF2B5EF4-FFF2-40B4-BE49-F238E27FC236}">
-                <a16:creationId xmlns:a16="http://schemas.microsoft.com/office/drawing/2014/main" id="{78F8FCF1-8D6F-4FC8-97B9-95F2A6E235D6}"/>
-              </a:ext>
-            </a:extLst>
-          </p:cNvPr>
-          <p:cNvSpPr>
-            <a:spLocks noGrp="1"/>
-          </p:cNvSpPr>
-          <p:nvPr>
-            <p:ph type="sldNum" sz="quarter" idx="12"/>
-          </p:nvPr>
-        </p:nvSpPr>
-        <p:spPr/>
-        <p:txBody>
-          <a:bodyPr/>
-          <a:lstStyle/>
-          <a:p>
-            <a:fld id="{D9011FF2-DFD3-6445-BBA2-CB95B68222FB}" type="slidenum">
-              <a:rPr lang="en-US" smtClean="0"/>
-              <a:t>2</a:t>
-            </a:fld>
-            <a:endParaRPr lang="en-US"/>
-          </a:p>
-        </p:txBody>
-      </p:sp>
-      <p:sp>
-        <p:nvSpPr>
-          <p:cNvPr id="6" name="Content Placeholder 2">
-            <a:extLst>
-              <a:ext uri="{FF2B5EF4-FFF2-40B4-BE49-F238E27FC236}">
-                <a16:creationId xmlns:a16="http://schemas.microsoft.com/office/drawing/2014/main" id="{71B28740-240D-4D70-8031-4D6AEAD71F6D}"/>
+                <a16:creationId xmlns:a16="http://schemas.microsoft.com/office/drawing/2014/main" id="{1EFBE422-0FF7-415C-A78D-2BE2D6B68BA7}"/>
               </a:ext>
             </a:extLst>
           </p:cNvPr>
@@ -4502,128 +4703,84 @@
           </a:xfrm>
         </p:spPr>
         <p:txBody>
-          <a:bodyPr numCol="2"/>
+          <a:bodyPr/>
           <a:lstStyle/>
           <a:p>
             <a:r>
               <a:rPr lang="en-US" dirty="0"/>
-              <a:t>Conformance Specification </a:t>
-            </a:r>
-          </a:p>
-          <a:p>
-            <a:pPr lvl="1"/>
+              <a:t>NIEM 5.0 Status</a:t>
+            </a:r>
+          </a:p>
+          <a:p>
             <a:r>
               <a:rPr lang="en-US" dirty="0"/>
-              <a:t>@ 3.0</a:t>
+              <a:t>NIEM Message Specification 1.0 Rules and Conventions</a:t>
             </a:r>
           </a:p>
           <a:p>
             <a:r>
               <a:rPr lang="en-US" dirty="0"/>
-              <a:t>Naming &amp; Design Rules </a:t>
-            </a:r>
-          </a:p>
-          <a:p>
-            <a:pPr lvl="1"/>
+              <a:t>Tools</a:t>
+            </a:r>
+          </a:p>
+          <a:p>
             <a:r>
               <a:rPr lang="en-US" dirty="0"/>
-              <a:t>@4.0</a:t>
-            </a:r>
-          </a:p>
-          <a:p>
-            <a:pPr lvl="1"/>
+              <a:t>NIEM Models</a:t>
+            </a:r>
+          </a:p>
+          <a:p>
             <a:r>
               <a:rPr lang="en-US" dirty="0"/>
-              <a:t>In progress</a:t>
+              <a:t>Other Topics</a:t>
             </a:r>
           </a:p>
           <a:p>
             <a:r>
               <a:rPr lang="en-US" dirty="0"/>
-              <a:t>Conformance Targets Attribute Specification </a:t>
-            </a:r>
-          </a:p>
-          <a:p>
-            <a:pPr lvl="1"/>
-            <a:r>
-              <a:rPr lang="en-US" dirty="0"/>
-              <a:t>@3.0</a:t>
-            </a:r>
-          </a:p>
-          <a:p>
-            <a:r>
-              <a:rPr lang="en-US" dirty="0"/>
-              <a:t>NIEM Code Lists Specification </a:t>
-            </a:r>
-          </a:p>
-          <a:p>
-            <a:pPr lvl="1"/>
-            <a:r>
-              <a:rPr lang="en-US" dirty="0"/>
-              <a:t>@3.0</a:t>
-            </a:r>
-          </a:p>
-          <a:p>
-            <a:pPr lvl="1"/>
-            <a:r>
-              <a:rPr lang="en-US" dirty="0" err="1"/>
-              <a:t>Todo</a:t>
-            </a:r>
-            <a:r>
-              <a:rPr lang="en-US" dirty="0"/>
-              <a:t>: add v5 schema</a:t>
-            </a:r>
-          </a:p>
-          <a:p>
-            <a:pPr lvl="1"/>
+              <a:t>NTAC-NBAC</a:t>
+            </a:r>
+            <a:r>
+              <a:rPr lang="en-US" baseline="0" dirty="0"/>
+              <a:t> Interactions</a:t>
+            </a:r>
             <a:endParaRPr lang="en-US" dirty="0"/>
           </a:p>
-          <a:p>
-            <a:r>
-              <a:rPr lang="en-US" dirty="0"/>
-              <a:t>NIEM JSON Specification </a:t>
-            </a:r>
-          </a:p>
-          <a:p>
-            <a:pPr lvl="1"/>
-            <a:r>
-              <a:rPr lang="en-US" dirty="0"/>
-              <a:t>@4.0rc1</a:t>
-            </a:r>
-          </a:p>
-          <a:p>
-            <a:pPr lvl="1"/>
-            <a:r>
-              <a:rPr lang="en-US" dirty="0"/>
-              <a:t>In progress</a:t>
-            </a:r>
-          </a:p>
-          <a:p>
-            <a:r>
-              <a:rPr lang="en-US" dirty="0"/>
-              <a:t>NIEM IEPD Specification </a:t>
-            </a:r>
-          </a:p>
-          <a:p>
-            <a:pPr lvl="1"/>
-            <a:r>
-              <a:rPr lang="en-US" dirty="0"/>
-              <a:t>MPD Spec @3.0</a:t>
-            </a:r>
-          </a:p>
-          <a:p>
-            <a:pPr lvl="1"/>
-            <a:r>
-              <a:rPr lang="en-US" dirty="0"/>
-              <a:t>In progress</a:t>
-            </a:r>
+        </p:txBody>
+      </p:sp>
+      <p:sp>
+        <p:nvSpPr>
+          <p:cNvPr id="4" name="Slide Number Placeholder 3">
+            <a:extLst>
+              <a:ext uri="{FF2B5EF4-FFF2-40B4-BE49-F238E27FC236}">
+                <a16:creationId xmlns:a16="http://schemas.microsoft.com/office/drawing/2014/main" id="{C96D321C-0922-4433-9D29-699FB9EE23E0}"/>
+              </a:ext>
+            </a:extLst>
+          </p:cNvPr>
+          <p:cNvSpPr>
+            <a:spLocks noGrp="1"/>
+          </p:cNvSpPr>
+          <p:nvPr>
+            <p:ph type="sldNum" sz="quarter" idx="12"/>
+          </p:nvPr>
+        </p:nvSpPr>
+        <p:spPr/>
+        <p:txBody>
+          <a:bodyPr/>
+          <a:lstStyle/>
+          <a:p>
+            <a:fld id="{D9011FF2-DFD3-6445-BBA2-CB95B68222FB}" type="slidenum">
+              <a:rPr lang="en-US" smtClean="0"/>
+              <a:t>2</a:t>
+            </a:fld>
+            <a:endParaRPr lang="en-US"/>
           </a:p>
         </p:txBody>
       </p:sp>
     </p:spTree>
     <p:extLst>
       <p:ext uri="{BB962C8B-B14F-4D97-AF65-F5344CB8AC3E}">
-        <p14:creationId xmlns:p14="http://schemas.microsoft.com/office/powerpoint/2010/main" val="632509890"/>
+        <p14:creationId xmlns:p14="http://schemas.microsoft.com/office/powerpoint/2010/main" val="2480248153"/>
       </p:ext>
     </p:extLst>
   </p:cSld>
@@ -4681,87 +4838,7 @@
                 <a:ea typeface="+mj-ea"/>
                 <a:cs typeface="+mj-cs"/>
               </a:rPr>
-              <a:t>NIEM Message Specification 1.0 Rules and Conventions</a:t>
-            </a:r>
-            <a:endParaRPr lang="en-US" dirty="0"/>
-          </a:p>
-        </p:txBody>
-      </p:sp>
-      <p:sp>
-        <p:nvSpPr>
-          <p:cNvPr id="3" name="Content Placeholder 2">
-            <a:extLst>
-              <a:ext uri="{FF2B5EF4-FFF2-40B4-BE49-F238E27FC236}">
-                <a16:creationId xmlns:a16="http://schemas.microsoft.com/office/drawing/2014/main" id="{6A81AFBB-2B54-4F4C-B7E6-0C20C1EF7EF3}"/>
-              </a:ext>
-            </a:extLst>
-          </p:cNvPr>
-          <p:cNvSpPr>
-            <a:spLocks noGrp="1"/>
-          </p:cNvSpPr>
-          <p:nvPr>
-            <p:ph idx="1"/>
-          </p:nvPr>
-        </p:nvSpPr>
-        <p:spPr>
-          <a:xfrm>
-            <a:off x="213756" y="1534158"/>
-            <a:ext cx="11780322" cy="4618164"/>
-          </a:xfrm>
-        </p:spPr>
-        <p:txBody>
-          <a:bodyPr/>
-          <a:lstStyle/>
-          <a:p>
-            <a:r>
-              <a:rPr lang="en-US" dirty="0"/>
-              <a:t>New name for MPD spec/IEPD spec</a:t>
-            </a:r>
-          </a:p>
-          <a:p>
-            <a:r>
-              <a:rPr lang="en-US" dirty="0"/>
-              <a:t>Document that describes the content and structure of a message specification</a:t>
-            </a:r>
-          </a:p>
-          <a:p>
-            <a:r>
-              <a:rPr lang="en-US" dirty="0"/>
-              <a:t>New terminology: “Message Specification” term replaces “IEPD”, etc.</a:t>
-            </a:r>
-          </a:p>
-          <a:p>
-            <a:r>
-              <a:rPr lang="en-US" dirty="0"/>
-              <a:t>Convention over configuration</a:t>
-            </a:r>
-          </a:p>
-          <a:p>
-            <a:r>
-              <a:rPr lang="en-US" dirty="0"/>
-              <a:t>Radically simplified directory structure</a:t>
-            </a:r>
-          </a:p>
-          <a:p>
-            <a:r>
-              <a:rPr lang="en-US" dirty="0"/>
-              <a:t>Optional machine readable metadata</a:t>
-            </a:r>
-          </a:p>
-          <a:p>
-            <a:r>
-              <a:rPr lang="en-US" dirty="0"/>
-              <a:t>Simplified manifest file replaces MPD catalog</a:t>
-            </a:r>
-          </a:p>
-          <a:p>
-            <a:r>
-              <a:rPr lang="en-US" dirty="0"/>
-              <a:t>Readme</a:t>
-            </a:r>
-            <a:r>
-              <a:rPr lang="en-US" baseline="0" dirty="0"/>
-              <a:t> and other documentation</a:t>
+              <a:t>NIEM 5.0 Status</a:t>
             </a:r>
             <a:endParaRPr lang="en-US" dirty="0"/>
           </a:p>
@@ -4796,10 +4873,163 @@
           </a:p>
         </p:txBody>
       </p:sp>
+      <p:sp>
+        <p:nvSpPr>
+          <p:cNvPr id="6" name="Content Placeholder 2">
+            <a:extLst>
+              <a:ext uri="{FF2B5EF4-FFF2-40B4-BE49-F238E27FC236}">
+                <a16:creationId xmlns:a16="http://schemas.microsoft.com/office/drawing/2014/main" id="{71B28740-240D-4D70-8031-4D6AEAD71F6D}"/>
+              </a:ext>
+            </a:extLst>
+          </p:cNvPr>
+          <p:cNvSpPr>
+            <a:spLocks noGrp="1"/>
+          </p:cNvSpPr>
+          <p:nvPr>
+            <p:ph idx="1"/>
+          </p:nvPr>
+        </p:nvSpPr>
+        <p:spPr>
+          <a:xfrm>
+            <a:off x="213756" y="1258784"/>
+            <a:ext cx="11780322" cy="5330296"/>
+          </a:xfrm>
+        </p:spPr>
+        <p:txBody>
+          <a:bodyPr numCol="2"/>
+          <a:lstStyle/>
+          <a:p>
+            <a:r>
+              <a:rPr lang="en-US" dirty="0"/>
+              <a:t>Conformance Specification </a:t>
+            </a:r>
+          </a:p>
+          <a:p>
+            <a:pPr lvl="1"/>
+            <a:r>
+              <a:rPr lang="en-US" dirty="0"/>
+              <a:t>@ 3.0</a:t>
+            </a:r>
+          </a:p>
+          <a:p>
+            <a:r>
+              <a:rPr lang="en-US" dirty="0"/>
+              <a:t>Naming &amp; Design Rules </a:t>
+            </a:r>
+          </a:p>
+          <a:p>
+            <a:pPr lvl="1"/>
+            <a:r>
+              <a:rPr lang="en-US" dirty="0"/>
+              <a:t>@4.0</a:t>
+            </a:r>
+          </a:p>
+          <a:p>
+            <a:pPr lvl="1"/>
+            <a:r>
+              <a:rPr lang="en-US" dirty="0"/>
+              <a:t>In progress</a:t>
+            </a:r>
+          </a:p>
+          <a:p>
+            <a:r>
+              <a:rPr lang="en-US" dirty="0"/>
+              <a:t>Conformance Targets Attribute Specification </a:t>
+            </a:r>
+          </a:p>
+          <a:p>
+            <a:pPr lvl="1"/>
+            <a:r>
+              <a:rPr lang="en-US" dirty="0"/>
+              <a:t>@3.0</a:t>
+            </a:r>
+          </a:p>
+          <a:p>
+            <a:r>
+              <a:rPr lang="en-US" dirty="0"/>
+              <a:t>NIEM Code Lists Specification </a:t>
+            </a:r>
+          </a:p>
+          <a:p>
+            <a:pPr lvl="1"/>
+            <a:r>
+              <a:rPr lang="en-US" dirty="0"/>
+              <a:t>@3.0</a:t>
+            </a:r>
+          </a:p>
+          <a:p>
+            <a:pPr lvl="1"/>
+            <a:r>
+              <a:rPr lang="en-US" dirty="0" err="1"/>
+              <a:t>Todo</a:t>
+            </a:r>
+            <a:r>
+              <a:rPr lang="en-US" dirty="0"/>
+              <a:t>: add v5 schema</a:t>
+            </a:r>
+          </a:p>
+          <a:p>
+            <a:pPr lvl="1"/>
+            <a:endParaRPr lang="en-US" dirty="0"/>
+          </a:p>
+          <a:p>
+            <a:r>
+              <a:rPr lang="en-US" dirty="0"/>
+              <a:t>NIEM JSON Specification </a:t>
+            </a:r>
+          </a:p>
+          <a:p>
+            <a:pPr lvl="1"/>
+            <a:r>
+              <a:rPr lang="en-US" dirty="0"/>
+              <a:t>@4.0rc1</a:t>
+            </a:r>
+          </a:p>
+          <a:p>
+            <a:pPr lvl="1"/>
+            <a:r>
+              <a:rPr lang="en-US" dirty="0"/>
+              <a:t>In progress</a:t>
+            </a:r>
+          </a:p>
+          <a:p>
+            <a:r>
+              <a:rPr lang="en-US" dirty="0"/>
+              <a:t>NIEM IEPD Specification </a:t>
+            </a:r>
+          </a:p>
+          <a:p>
+            <a:pPr lvl="1"/>
+            <a:r>
+              <a:rPr lang="en-US" dirty="0"/>
+              <a:t>MPD Spec @3.0</a:t>
+            </a:r>
+          </a:p>
+          <a:p>
+            <a:pPr lvl="1"/>
+            <a:r>
+              <a:rPr lang="en-US" dirty="0"/>
+              <a:t>In progress</a:t>
+            </a:r>
+          </a:p>
+          <a:p>
+            <a:r>
+              <a:rPr lang="en-US" dirty="0"/>
+              <a:t>GENC simple type annotation</a:t>
+            </a:r>
+          </a:p>
+          <a:p>
+            <a:r>
+              <a:rPr lang="en-US" dirty="0"/>
+              <a:t>Updated GML Profile</a:t>
+            </a:r>
+          </a:p>
+        </p:txBody>
+      </p:sp>
     </p:spTree>
     <p:extLst>
       <p:ext uri="{BB962C8B-B14F-4D97-AF65-F5344CB8AC3E}">
-        <p14:creationId xmlns:p14="http://schemas.microsoft.com/office/powerpoint/2010/main" val="1054071046"/>
+        <p14:creationId xmlns:p14="http://schemas.microsoft.com/office/powerpoint/2010/main" val="632509890"/>
       </p:ext>
     </p:extLst>
   </p:cSld>
@@ -4831,7 +5061,7 @@
           <p:cNvPr id="2" name="Title 1">
             <a:extLst>
               <a:ext uri="{FF2B5EF4-FFF2-40B4-BE49-F238E27FC236}">
-                <a16:creationId xmlns:a16="http://schemas.microsoft.com/office/drawing/2014/main" id="{1A0249E2-86FC-4A61-99F4-643D4D1FFB2E}"/>
+                <a16:creationId xmlns:a16="http://schemas.microsoft.com/office/drawing/2014/main" id="{CCA4D90B-6B9F-4216-A760-603A01DCCE74}"/>
               </a:ext>
             </a:extLst>
           </p:cNvPr>
@@ -4848,18 +5078,27 @@
           <a:lstStyle/>
           <a:p>
             <a:r>
-              <a:rPr lang="en-US" dirty="0"/>
-              <a:t>Radically Simplified directory structure</a:t>
-            </a:r>
+              <a:rPr lang="en-US" sz="4400" kern="1200" dirty="0">
+                <a:solidFill>
+                  <a:schemeClr val="tx1"/>
+                </a:solidFill>
+                <a:effectLst/>
+                <a:latin typeface="+mj-lt"/>
+                <a:ea typeface="+mj-ea"/>
+                <a:cs typeface="+mj-cs"/>
+              </a:rPr>
+              <a:t>NIEM Message Specification 1.0 Rules and Conventions</a:t>
+            </a:r>
+            <a:endParaRPr lang="en-US" dirty="0"/>
           </a:p>
         </p:txBody>
       </p:sp>
       <p:sp>
         <p:nvSpPr>
-          <p:cNvPr id="6" name="Content Placeholder 5">
+          <p:cNvPr id="3" name="Content Placeholder 2">
             <a:extLst>
               <a:ext uri="{FF2B5EF4-FFF2-40B4-BE49-F238E27FC236}">
-                <a16:creationId xmlns:a16="http://schemas.microsoft.com/office/drawing/2014/main" id="{3793435E-A9DB-41A3-8043-477F32C5B95D}"/>
+                <a16:creationId xmlns:a16="http://schemas.microsoft.com/office/drawing/2014/main" id="{6A81AFBB-2B54-4F4C-B7E6-0C20C1EF7EF3}"/>
               </a:ext>
             </a:extLst>
           </p:cNvPr>
@@ -4870,307 +5109,76 @@
             <p:ph idx="1"/>
           </p:nvPr>
         </p:nvSpPr>
-        <p:spPr/>
+        <p:spPr>
+          <a:xfrm>
+            <a:off x="213756" y="1534158"/>
+            <a:ext cx="11780322" cy="4618164"/>
+          </a:xfrm>
+        </p:spPr>
         <p:txBody>
-          <a:bodyPr>
-            <a:normAutofit/>
-          </a:bodyPr>
+          <a:bodyPr/>
           <a:lstStyle/>
           <a:p>
             <a:r>
               <a:rPr lang="en-US" dirty="0"/>
-              <a:t>/ : root of the message spec</a:t>
-            </a:r>
-          </a:p>
-          <a:p>
-            <a:pPr lvl="1"/>
-            <a:r>
-              <a:rPr lang="en-US" sz="2000" b="1" dirty="0">
-                <a:latin typeface="Courier New" panose="02070309020205020404" pitchFamily="49" charset="0"/>
-                <a:cs typeface="Courier New" panose="02070309020205020404" pitchFamily="49" charset="0"/>
-              </a:rPr>
-              <a:t>/schema{.*,.</a:t>
-            </a:r>
-            <a:r>
-              <a:rPr lang="en-US" sz="2000" b="1" dirty="0" err="1">
-                <a:latin typeface="Courier New" panose="02070309020205020404" pitchFamily="49" charset="0"/>
-                <a:cs typeface="Courier New" panose="02070309020205020404" pitchFamily="49" charset="0"/>
-              </a:rPr>
-              <a:t>base,.constraint</a:t>
-            </a:r>
-            <a:r>
-              <a:rPr lang="en-US" sz="2000" b="1" dirty="0">
-                <a:latin typeface="Courier New" panose="02070309020205020404" pitchFamily="49" charset="0"/>
-                <a:cs typeface="Courier New" panose="02070309020205020404" pitchFamily="49" charset="0"/>
-              </a:rPr>
-              <a:t>}.{</a:t>
-            </a:r>
-            <a:r>
-              <a:rPr lang="en-US" sz="2000" b="1" dirty="0" err="1">
-                <a:latin typeface="Courier New" panose="02070309020205020404" pitchFamily="49" charset="0"/>
-                <a:cs typeface="Courier New" panose="02070309020205020404" pitchFamily="49" charset="0"/>
-              </a:rPr>
-              <a:t>xsd,json</a:t>
-            </a:r>
-            <a:r>
-              <a:rPr lang="en-US" sz="2000" b="1" dirty="0">
-                <a:latin typeface="Courier New" panose="02070309020205020404" pitchFamily="49" charset="0"/>
-                <a:cs typeface="Courier New" panose="02070309020205020404" pitchFamily="49" charset="0"/>
-              </a:rPr>
-              <a:t>}</a:t>
-            </a:r>
-          </a:p>
-          <a:p>
-            <a:pPr lvl="1"/>
-            <a:r>
-              <a:rPr lang="en-US" sz="2000" b="1" dirty="0">
-                <a:latin typeface="Courier New" panose="02070309020205020404" pitchFamily="49" charset="0"/>
-                <a:cs typeface="Courier New" panose="02070309020205020404" pitchFamily="49" charset="0"/>
-              </a:rPr>
-              <a:t>/manifest.{</a:t>
-            </a:r>
-            <a:r>
-              <a:rPr lang="en-US" sz="2000" b="1" dirty="0" err="1">
-                <a:latin typeface="Courier New" panose="02070309020205020404" pitchFamily="49" charset="0"/>
-                <a:cs typeface="Courier New" panose="02070309020205020404" pitchFamily="49" charset="0"/>
-              </a:rPr>
-              <a:t>json,xml,csv</a:t>
-            </a:r>
-            <a:r>
-              <a:rPr lang="en-US" sz="2000" b="1" dirty="0">
-                <a:latin typeface="Courier New" panose="02070309020205020404" pitchFamily="49" charset="0"/>
-                <a:cs typeface="Courier New" panose="02070309020205020404" pitchFamily="49" charset="0"/>
-              </a:rPr>
-              <a:t>} </a:t>
-            </a:r>
+              <a:t>New name for MPD spec/IEPD spec</a:t>
+            </a:r>
+          </a:p>
+          <a:p>
             <a:r>
               <a:rPr lang="en-US" dirty="0"/>
-              <a:t>: replaces </a:t>
-            </a:r>
-            <a:r>
-              <a:rPr lang="en-US" dirty="0" err="1"/>
-              <a:t>mpd</a:t>
-            </a:r>
+              <a:t>Document that describes the content and structure of a message specification</a:t>
+            </a:r>
+          </a:p>
+          <a:p>
             <a:r>
               <a:rPr lang="en-US" dirty="0"/>
-              <a:t>-catalog</a:t>
-            </a:r>
-          </a:p>
-          <a:p>
-            <a:pPr lvl="1"/>
-            <a:r>
-              <a:rPr lang="en-US" sz="2000" b="1" dirty="0">
-                <a:latin typeface="Courier New" panose="02070309020205020404" pitchFamily="49" charset="0"/>
-                <a:cs typeface="Courier New" panose="02070309020205020404" pitchFamily="49" charset="0"/>
-              </a:rPr>
-              <a:t>/metadata.{</a:t>
-            </a:r>
-            <a:r>
-              <a:rPr lang="en-US" sz="2000" b="1" dirty="0" err="1">
-                <a:latin typeface="Courier New" panose="02070309020205020404" pitchFamily="49" charset="0"/>
-                <a:cs typeface="Courier New" panose="02070309020205020404" pitchFamily="49" charset="0"/>
-              </a:rPr>
-              <a:t>json,xml,csv</a:t>
-            </a:r>
-            <a:r>
-              <a:rPr lang="en-US" sz="2000" b="1" dirty="0">
-                <a:latin typeface="Courier New" panose="02070309020205020404" pitchFamily="49" charset="0"/>
-                <a:cs typeface="Courier New" panose="02070309020205020404" pitchFamily="49" charset="0"/>
-              </a:rPr>
-              <a:t>} </a:t>
-            </a:r>
+              <a:t>New terminology: “Message Specification” term replaces “IEPD”, etc.</a:t>
+            </a:r>
+          </a:p>
+          <a:p>
             <a:r>
               <a:rPr lang="en-US" dirty="0"/>
-              <a:t>: POCs</a:t>
-            </a:r>
-          </a:p>
-          <a:p>
-            <a:pPr lvl="2"/>
+              <a:t>Convention over configuration</a:t>
+            </a:r>
+          </a:p>
+          <a:p>
             <a:r>
               <a:rPr lang="en-US" dirty="0"/>
-              <a:t>or </a:t>
-            </a:r>
-            <a:r>
-              <a:rPr lang="en-US" b="1" dirty="0">
-                <a:latin typeface="Courier New" panose="02070309020205020404" pitchFamily="49" charset="0"/>
-                <a:cs typeface="Courier New" panose="02070309020205020404" pitchFamily="49" charset="0"/>
-              </a:rPr>
-              <a:t>/about.*</a:t>
-            </a:r>
-          </a:p>
-          <a:p>
-            <a:pPr lvl="1"/>
-            <a:r>
-              <a:rPr lang="en-US" sz="2000" b="1" dirty="0">
-                <a:latin typeface="Courier New" panose="02070309020205020404" pitchFamily="49" charset="0"/>
-                <a:cs typeface="Courier New" panose="02070309020205020404" pitchFamily="49" charset="0"/>
-              </a:rPr>
-              <a:t>/rules{.*}.sch </a:t>
-            </a:r>
+              <a:t>Radically simplified directory structure</a:t>
+            </a:r>
+          </a:p>
+          <a:p>
             <a:r>
               <a:rPr lang="en-US" dirty="0"/>
-              <a:t>: </a:t>
-            </a:r>
-            <a:r>
-              <a:rPr lang="en-US" dirty="0" err="1"/>
-              <a:t>schematron</a:t>
-            </a:r>
+              <a:t>Optional machine readable metadata</a:t>
+            </a:r>
+          </a:p>
+          <a:p>
             <a:r>
               <a:rPr lang="en-US" dirty="0"/>
-              <a:t> constraints</a:t>
-            </a:r>
-          </a:p>
-          <a:p>
-            <a:pPr lvl="1"/>
-            <a:r>
-              <a:rPr lang="fr-FR" sz="2000" b="1" dirty="0">
-                <a:latin typeface="Courier New" panose="02070309020205020404" pitchFamily="49" charset="0"/>
-                <a:cs typeface="Courier New" panose="02070309020205020404" pitchFamily="49" charset="0"/>
-              </a:rPr>
-              <a:t>/</a:t>
-            </a:r>
-            <a:r>
-              <a:rPr lang="fr-FR" sz="2000" b="1" dirty="0" err="1">
-                <a:latin typeface="Courier New" panose="02070309020205020404" pitchFamily="49" charset="0"/>
-                <a:cs typeface="Courier New" panose="02070309020205020404" pitchFamily="49" charset="0"/>
-              </a:rPr>
-              <a:t>examples</a:t>
-            </a:r>
-            <a:r>
-              <a:rPr lang="fr-FR" sz="2000" b="1" dirty="0">
-                <a:latin typeface="Courier New" panose="02070309020205020404" pitchFamily="49" charset="0"/>
-                <a:cs typeface="Courier New" panose="02070309020205020404" pitchFamily="49" charset="0"/>
-              </a:rPr>
-              <a:t>/*.{</a:t>
-            </a:r>
-            <a:r>
-              <a:rPr lang="fr-FR" sz="2000" b="1" dirty="0" err="1">
-                <a:latin typeface="Courier New" panose="02070309020205020404" pitchFamily="49" charset="0"/>
-                <a:cs typeface="Courier New" panose="02070309020205020404" pitchFamily="49" charset="0"/>
-              </a:rPr>
-              <a:t>json,xml</a:t>
-            </a:r>
-            <a:r>
-              <a:rPr lang="fr-FR" sz="2000" b="1" dirty="0">
-                <a:latin typeface="Courier New" panose="02070309020205020404" pitchFamily="49" charset="0"/>
-                <a:cs typeface="Courier New" panose="02070309020205020404" pitchFamily="49" charset="0"/>
-              </a:rPr>
-              <a:t>} </a:t>
-            </a:r>
-            <a:r>
-              <a:rPr lang="fr-FR" dirty="0"/>
-              <a:t>: </a:t>
-            </a:r>
-            <a:r>
-              <a:rPr lang="fr-FR" dirty="0" err="1"/>
-              <a:t>sample</a:t>
-            </a:r>
-            <a:r>
-              <a:rPr lang="fr-FR" dirty="0"/>
-              <a:t> instances</a:t>
-            </a:r>
-          </a:p>
-          <a:p>
-            <a:pPr lvl="1"/>
-            <a:r>
-              <a:rPr lang="en-US" sz="2000" b="1" dirty="0">
-                <a:latin typeface="Courier New" panose="02070309020205020404" pitchFamily="49" charset="0"/>
-                <a:cs typeface="Courier New" panose="02070309020205020404" pitchFamily="49" charset="0"/>
-              </a:rPr>
-              <a:t>/README.{</a:t>
-            </a:r>
-            <a:r>
-              <a:rPr lang="en-US" sz="2000" b="1" dirty="0" err="1">
-                <a:latin typeface="Courier New" panose="02070309020205020404" pitchFamily="49" charset="0"/>
-                <a:cs typeface="Courier New" panose="02070309020205020404" pitchFamily="49" charset="0"/>
-              </a:rPr>
-              <a:t>md,txt,docx</a:t>
-            </a:r>
-            <a:r>
-              <a:rPr lang="en-US" sz="2000" b="1" dirty="0">
-                <a:latin typeface="Courier New" panose="02070309020205020404" pitchFamily="49" charset="0"/>
-                <a:cs typeface="Courier New" panose="02070309020205020404" pitchFamily="49" charset="0"/>
-              </a:rPr>
-              <a:t>} </a:t>
-            </a:r>
+              <a:t>Simplified manifest file replaces MPD catalog</a:t>
+            </a:r>
+          </a:p>
+          <a:p>
             <a:r>
               <a:rPr lang="en-US" dirty="0"/>
-              <a:t>: human-readable documentation starting point</a:t>
-            </a:r>
-          </a:p>
-          <a:p>
-            <a:r>
-              <a:rPr lang="en-US" dirty="0"/>
-              <a:t>Additional conventions : do not affect the implied manifest</a:t>
-            </a:r>
-          </a:p>
-          <a:p>
-            <a:pPr lvl="1"/>
-            <a:r>
-              <a:rPr lang="en-US" sz="2000" b="1" dirty="0">
-                <a:latin typeface="Courier New" panose="02070309020205020404" pitchFamily="49" charset="0"/>
-                <a:cs typeface="Courier New" panose="02070309020205020404" pitchFamily="49" charset="0"/>
-              </a:rPr>
-              <a:t>/documentation </a:t>
-            </a:r>
-            <a:r>
-              <a:rPr lang="en-US" dirty="0"/>
-              <a:t>: folder for human-</a:t>
-            </a:r>
-            <a:r>
-              <a:rPr lang="en-US" dirty="0" err="1"/>
-              <a:t>readabe</a:t>
-            </a:r>
-            <a:r>
-              <a:rPr lang="en-US" dirty="0"/>
-              <a:t> documentation</a:t>
-            </a:r>
-          </a:p>
-          <a:p>
-            <a:pPr lvl="1"/>
-            <a:r>
-              <a:rPr lang="en-US" sz="2000" b="1" dirty="0">
-                <a:latin typeface="Courier New" panose="02070309020205020404" pitchFamily="49" charset="0"/>
-                <a:cs typeface="Courier New" panose="02070309020205020404" pitchFamily="49" charset="0"/>
-              </a:rPr>
-              <a:t>/xsd/</a:t>
-            </a:r>
-            <a:r>
-              <a:rPr lang="en-US" sz="2000" b="1" dirty="0" err="1">
-                <a:latin typeface="Courier New" panose="02070309020205020404" pitchFamily="49" charset="0"/>
-                <a:cs typeface="Courier New" panose="02070309020205020404" pitchFamily="49" charset="0"/>
-              </a:rPr>
-              <a:t>niem</a:t>
-            </a:r>
-            <a:endParaRPr lang="en-US" sz="2000" b="1" dirty="0">
-              <a:latin typeface="Courier New" panose="02070309020205020404" pitchFamily="49" charset="0"/>
-              <a:cs typeface="Courier New" panose="02070309020205020404" pitchFamily="49" charset="0"/>
-            </a:endParaRPr>
-          </a:p>
-          <a:p>
-            <a:pPr lvl="1"/>
-            <a:r>
-              <a:rPr lang="en-US" sz="2000" b="1" dirty="0">
-                <a:latin typeface="Courier New" panose="02070309020205020404" pitchFamily="49" charset="0"/>
-                <a:cs typeface="Courier New" panose="02070309020205020404" pitchFamily="49" charset="0"/>
-              </a:rPr>
-              <a:t>/xsd/extension.xsd</a:t>
-            </a:r>
-          </a:p>
-          <a:p>
-            <a:r>
-              <a:rPr lang="en-US" dirty="0"/>
-              <a:t>All schema location based, rather than XML Catalogs to resolve at the top level</a:t>
-            </a:r>
+              <a:t>Readme</a:t>
+            </a:r>
+            <a:r>
+              <a:rPr lang="en-US" baseline="0" dirty="0"/>
+              <a:t> and other documentation</a:t>
+            </a:r>
+            <a:endParaRPr lang="en-US" dirty="0"/>
           </a:p>
         </p:txBody>
       </p:sp>
       <p:sp>
         <p:nvSpPr>
-          <p:cNvPr id="3" name="Slide Number Placeholder 2">
+          <p:cNvPr id="4" name="Slide Number Placeholder 3">
             <a:extLst>
               <a:ext uri="{FF2B5EF4-FFF2-40B4-BE49-F238E27FC236}">
-                <a16:creationId xmlns:a16="http://schemas.microsoft.com/office/drawing/2014/main" id="{262E3C6B-AC00-43E7-A6F2-B7154DACC154}"/>
+                <a16:creationId xmlns:a16="http://schemas.microsoft.com/office/drawing/2014/main" id="{78F8FCF1-8D6F-4FC8-97B9-95F2A6E235D6}"/>
               </a:ext>
             </a:extLst>
           </p:cNvPr>
@@ -5197,7 +5205,7 @@
     </p:spTree>
     <p:extLst>
       <p:ext uri="{BB962C8B-B14F-4D97-AF65-F5344CB8AC3E}">
-        <p14:creationId xmlns:p14="http://schemas.microsoft.com/office/powerpoint/2010/main" val="3256467494"/>
+        <p14:creationId xmlns:p14="http://schemas.microsoft.com/office/powerpoint/2010/main" val="1054071046"/>
       </p:ext>
     </p:extLst>
   </p:cSld>
@@ -5229,7 +5237,7 @@
           <p:cNvPr id="2" name="Title 1">
             <a:extLst>
               <a:ext uri="{FF2B5EF4-FFF2-40B4-BE49-F238E27FC236}">
-                <a16:creationId xmlns:a16="http://schemas.microsoft.com/office/drawing/2014/main" id="{036DE374-984E-4916-B7D1-14E90E72A9C0}"/>
+                <a16:creationId xmlns:a16="http://schemas.microsoft.com/office/drawing/2014/main" id="{1A0249E2-86FC-4A61-99F4-643D4D1FFB2E}"/>
               </a:ext>
             </a:extLst>
           </p:cNvPr>
@@ -5247,7 +5255,339 @@
           <a:p>
             <a:r>
               <a:rPr lang="en-US" dirty="0"/>
-              <a:t>Tools</a:t>
+              <a:t>Radically Simplified directory structure</a:t>
+            </a:r>
+          </a:p>
+        </p:txBody>
+      </p:sp>
+      <p:sp>
+        <p:nvSpPr>
+          <p:cNvPr id="6" name="Content Placeholder 5">
+            <a:extLst>
+              <a:ext uri="{FF2B5EF4-FFF2-40B4-BE49-F238E27FC236}">
+                <a16:creationId xmlns:a16="http://schemas.microsoft.com/office/drawing/2014/main" id="{3793435E-A9DB-41A3-8043-477F32C5B95D}"/>
+              </a:ext>
+            </a:extLst>
+          </p:cNvPr>
+          <p:cNvSpPr>
+            <a:spLocks noGrp="1"/>
+          </p:cNvSpPr>
+          <p:nvPr>
+            <p:ph idx="1"/>
+          </p:nvPr>
+        </p:nvSpPr>
+        <p:spPr/>
+        <p:txBody>
+          <a:bodyPr>
+            <a:normAutofit/>
+          </a:bodyPr>
+          <a:lstStyle/>
+          <a:p>
+            <a:r>
+              <a:rPr lang="en-US" dirty="0"/>
+              <a:t>/ : root of the message spec</a:t>
+            </a:r>
+          </a:p>
+          <a:p>
+            <a:pPr lvl="1"/>
+            <a:r>
+              <a:rPr lang="en-US" sz="2000" b="1" dirty="0">
+                <a:latin typeface="Courier New" panose="02070309020205020404" pitchFamily="49" charset="0"/>
+                <a:cs typeface="Courier New" panose="02070309020205020404" pitchFamily="49" charset="0"/>
+              </a:rPr>
+              <a:t>/schema{.*,.</a:t>
+            </a:r>
+            <a:r>
+              <a:rPr lang="en-US" sz="2000" b="1" dirty="0" err="1">
+                <a:latin typeface="Courier New" panose="02070309020205020404" pitchFamily="49" charset="0"/>
+                <a:cs typeface="Courier New" panose="02070309020205020404" pitchFamily="49" charset="0"/>
+              </a:rPr>
+              <a:t>base,.constraint</a:t>
+            </a:r>
+            <a:r>
+              <a:rPr lang="en-US" sz="2000" b="1" dirty="0">
+                <a:latin typeface="Courier New" panose="02070309020205020404" pitchFamily="49" charset="0"/>
+                <a:cs typeface="Courier New" panose="02070309020205020404" pitchFamily="49" charset="0"/>
+              </a:rPr>
+              <a:t>}.{</a:t>
+            </a:r>
+            <a:r>
+              <a:rPr lang="en-US" sz="2000" b="1" dirty="0" err="1">
+                <a:latin typeface="Courier New" panose="02070309020205020404" pitchFamily="49" charset="0"/>
+                <a:cs typeface="Courier New" panose="02070309020205020404" pitchFamily="49" charset="0"/>
+              </a:rPr>
+              <a:t>xsd,json</a:t>
+            </a:r>
+            <a:r>
+              <a:rPr lang="en-US" sz="2000" b="1" dirty="0">
+                <a:latin typeface="Courier New" panose="02070309020205020404" pitchFamily="49" charset="0"/>
+                <a:cs typeface="Courier New" panose="02070309020205020404" pitchFamily="49" charset="0"/>
+              </a:rPr>
+              <a:t>}</a:t>
+            </a:r>
+          </a:p>
+          <a:p>
+            <a:pPr lvl="1"/>
+            <a:r>
+              <a:rPr lang="en-US" sz="2000" b="1" dirty="0">
+                <a:latin typeface="Courier New" panose="02070309020205020404" pitchFamily="49" charset="0"/>
+                <a:cs typeface="Courier New" panose="02070309020205020404" pitchFamily="49" charset="0"/>
+              </a:rPr>
+              <a:t>/manifest.{</a:t>
+            </a:r>
+            <a:r>
+              <a:rPr lang="en-US" sz="2000" b="1" dirty="0" err="1">
+                <a:latin typeface="Courier New" panose="02070309020205020404" pitchFamily="49" charset="0"/>
+                <a:cs typeface="Courier New" panose="02070309020205020404" pitchFamily="49" charset="0"/>
+              </a:rPr>
+              <a:t>json,xml,csv</a:t>
+            </a:r>
+            <a:r>
+              <a:rPr lang="en-US" sz="2000" b="1" dirty="0">
+                <a:latin typeface="Courier New" panose="02070309020205020404" pitchFamily="49" charset="0"/>
+                <a:cs typeface="Courier New" panose="02070309020205020404" pitchFamily="49" charset="0"/>
+              </a:rPr>
+              <a:t>} </a:t>
+            </a:r>
+            <a:r>
+              <a:rPr lang="en-US" dirty="0"/>
+              <a:t>: replaces </a:t>
+            </a:r>
+            <a:r>
+              <a:rPr lang="en-US" dirty="0" err="1"/>
+              <a:t>mpd</a:t>
+            </a:r>
+            <a:r>
+              <a:rPr lang="en-US" dirty="0"/>
+              <a:t>-catalog</a:t>
+            </a:r>
+          </a:p>
+          <a:p>
+            <a:pPr lvl="1"/>
+            <a:r>
+              <a:rPr lang="en-US" sz="2000" b="1" dirty="0">
+                <a:latin typeface="Courier New" panose="02070309020205020404" pitchFamily="49" charset="0"/>
+                <a:cs typeface="Courier New" panose="02070309020205020404" pitchFamily="49" charset="0"/>
+              </a:rPr>
+              <a:t>/metadata.{</a:t>
+            </a:r>
+            <a:r>
+              <a:rPr lang="en-US" sz="2000" b="1" dirty="0" err="1">
+                <a:latin typeface="Courier New" panose="02070309020205020404" pitchFamily="49" charset="0"/>
+                <a:cs typeface="Courier New" panose="02070309020205020404" pitchFamily="49" charset="0"/>
+              </a:rPr>
+              <a:t>json,xml,csv</a:t>
+            </a:r>
+            <a:r>
+              <a:rPr lang="en-US" sz="2000" b="1" dirty="0">
+                <a:latin typeface="Courier New" panose="02070309020205020404" pitchFamily="49" charset="0"/>
+                <a:cs typeface="Courier New" panose="02070309020205020404" pitchFamily="49" charset="0"/>
+              </a:rPr>
+              <a:t>} </a:t>
+            </a:r>
+            <a:r>
+              <a:rPr lang="en-US" dirty="0"/>
+              <a:t>: POCs</a:t>
+            </a:r>
+          </a:p>
+          <a:p>
+            <a:pPr lvl="2"/>
+            <a:r>
+              <a:rPr lang="en-US" dirty="0"/>
+              <a:t>or </a:t>
+            </a:r>
+            <a:r>
+              <a:rPr lang="en-US" b="1" dirty="0">
+                <a:latin typeface="Courier New" panose="02070309020205020404" pitchFamily="49" charset="0"/>
+                <a:cs typeface="Courier New" panose="02070309020205020404" pitchFamily="49" charset="0"/>
+              </a:rPr>
+              <a:t>/about.*</a:t>
+            </a:r>
+          </a:p>
+          <a:p>
+            <a:pPr lvl="1"/>
+            <a:r>
+              <a:rPr lang="en-US" sz="2000" b="1" dirty="0">
+                <a:latin typeface="Courier New" panose="02070309020205020404" pitchFamily="49" charset="0"/>
+                <a:cs typeface="Courier New" panose="02070309020205020404" pitchFamily="49" charset="0"/>
+              </a:rPr>
+              <a:t>/rules{.*}.sch </a:t>
+            </a:r>
+            <a:r>
+              <a:rPr lang="en-US" dirty="0"/>
+              <a:t>: </a:t>
+            </a:r>
+            <a:r>
+              <a:rPr lang="en-US" dirty="0" err="1"/>
+              <a:t>schematron</a:t>
+            </a:r>
+            <a:r>
+              <a:rPr lang="en-US" dirty="0"/>
+              <a:t> constraints</a:t>
+            </a:r>
+          </a:p>
+          <a:p>
+            <a:pPr lvl="1"/>
+            <a:r>
+              <a:rPr lang="fr-FR" sz="2000" b="1" dirty="0">
+                <a:latin typeface="Courier New" panose="02070309020205020404" pitchFamily="49" charset="0"/>
+                <a:cs typeface="Courier New" panose="02070309020205020404" pitchFamily="49" charset="0"/>
+              </a:rPr>
+              <a:t>/</a:t>
+            </a:r>
+            <a:r>
+              <a:rPr lang="fr-FR" sz="2000" b="1" dirty="0" err="1">
+                <a:latin typeface="Courier New" panose="02070309020205020404" pitchFamily="49" charset="0"/>
+                <a:cs typeface="Courier New" panose="02070309020205020404" pitchFamily="49" charset="0"/>
+              </a:rPr>
+              <a:t>examples</a:t>
+            </a:r>
+            <a:r>
+              <a:rPr lang="fr-FR" sz="2000" b="1" dirty="0">
+                <a:latin typeface="Courier New" panose="02070309020205020404" pitchFamily="49" charset="0"/>
+                <a:cs typeface="Courier New" panose="02070309020205020404" pitchFamily="49" charset="0"/>
+              </a:rPr>
+              <a:t>/*.{</a:t>
+            </a:r>
+            <a:r>
+              <a:rPr lang="fr-FR" sz="2000" b="1" dirty="0" err="1">
+                <a:latin typeface="Courier New" panose="02070309020205020404" pitchFamily="49" charset="0"/>
+                <a:cs typeface="Courier New" panose="02070309020205020404" pitchFamily="49" charset="0"/>
+              </a:rPr>
+              <a:t>json,xml</a:t>
+            </a:r>
+            <a:r>
+              <a:rPr lang="fr-FR" sz="2000" b="1" dirty="0">
+                <a:latin typeface="Courier New" panose="02070309020205020404" pitchFamily="49" charset="0"/>
+                <a:cs typeface="Courier New" panose="02070309020205020404" pitchFamily="49" charset="0"/>
+              </a:rPr>
+              <a:t>} </a:t>
+            </a:r>
+            <a:r>
+              <a:rPr lang="fr-FR" dirty="0"/>
+              <a:t>: </a:t>
+            </a:r>
+            <a:r>
+              <a:rPr lang="fr-FR" dirty="0" err="1"/>
+              <a:t>sample</a:t>
+            </a:r>
+            <a:r>
+              <a:rPr lang="fr-FR" dirty="0"/>
+              <a:t> instances</a:t>
+            </a:r>
+          </a:p>
+          <a:p>
+            <a:pPr lvl="1"/>
+            <a:r>
+              <a:rPr lang="en-US" sz="2000" b="1" dirty="0">
+                <a:latin typeface="Courier New" panose="02070309020205020404" pitchFamily="49" charset="0"/>
+                <a:cs typeface="Courier New" panose="02070309020205020404" pitchFamily="49" charset="0"/>
+              </a:rPr>
+              <a:t>/README.{</a:t>
+            </a:r>
+            <a:r>
+              <a:rPr lang="en-US" sz="2000" b="1" dirty="0" err="1">
+                <a:latin typeface="Courier New" panose="02070309020205020404" pitchFamily="49" charset="0"/>
+                <a:cs typeface="Courier New" panose="02070309020205020404" pitchFamily="49" charset="0"/>
+              </a:rPr>
+              <a:t>md,txt,docx</a:t>
+            </a:r>
+            <a:r>
+              <a:rPr lang="en-US" sz="2000" b="1" dirty="0">
+                <a:latin typeface="Courier New" panose="02070309020205020404" pitchFamily="49" charset="0"/>
+                <a:cs typeface="Courier New" panose="02070309020205020404" pitchFamily="49" charset="0"/>
+              </a:rPr>
+              <a:t>} </a:t>
+            </a:r>
+            <a:r>
+              <a:rPr lang="en-US" dirty="0"/>
+              <a:t>: human-readable documentation starting point</a:t>
+            </a:r>
+          </a:p>
+          <a:p>
+            <a:r>
+              <a:rPr lang="en-US" dirty="0"/>
+              <a:t>Additional conventions : do not affect the implied manifest</a:t>
+            </a:r>
+          </a:p>
+          <a:p>
+            <a:pPr lvl="1"/>
+            <a:r>
+              <a:rPr lang="en-US" sz="2000" b="1" dirty="0">
+                <a:latin typeface="Courier New" panose="02070309020205020404" pitchFamily="49" charset="0"/>
+                <a:cs typeface="Courier New" panose="02070309020205020404" pitchFamily="49" charset="0"/>
+              </a:rPr>
+              <a:t>/documentation </a:t>
+            </a:r>
+            <a:r>
+              <a:rPr lang="en-US" dirty="0"/>
+              <a:t>: folder for human-</a:t>
+            </a:r>
+            <a:r>
+              <a:rPr lang="en-US" dirty="0" err="1"/>
+              <a:t>readabe</a:t>
+            </a:r>
+            <a:r>
+              <a:rPr lang="en-US" dirty="0"/>
+              <a:t> documentation</a:t>
+            </a:r>
+          </a:p>
+          <a:p>
+            <a:pPr lvl="1"/>
+            <a:r>
+              <a:rPr lang="en-US" sz="2000" b="1" dirty="0">
+                <a:latin typeface="Courier New" panose="02070309020205020404" pitchFamily="49" charset="0"/>
+                <a:cs typeface="Courier New" panose="02070309020205020404" pitchFamily="49" charset="0"/>
+              </a:rPr>
+              <a:t>/xsd/</a:t>
+            </a:r>
+            <a:r>
+              <a:rPr lang="en-US" sz="2000" b="1" dirty="0" err="1">
+                <a:latin typeface="Courier New" panose="02070309020205020404" pitchFamily="49" charset="0"/>
+                <a:cs typeface="Courier New" panose="02070309020205020404" pitchFamily="49" charset="0"/>
+              </a:rPr>
+              <a:t>niem</a:t>
+            </a:r>
+            <a:endParaRPr lang="en-US" sz="2000" b="1" dirty="0">
+              <a:latin typeface="Courier New" panose="02070309020205020404" pitchFamily="49" charset="0"/>
+              <a:cs typeface="Courier New" panose="02070309020205020404" pitchFamily="49" charset="0"/>
+            </a:endParaRPr>
+          </a:p>
+          <a:p>
+            <a:pPr lvl="1"/>
+            <a:r>
+              <a:rPr lang="en-US" sz="2000" b="1" dirty="0">
+                <a:latin typeface="Courier New" panose="02070309020205020404" pitchFamily="49" charset="0"/>
+                <a:cs typeface="Courier New" panose="02070309020205020404" pitchFamily="49" charset="0"/>
+              </a:rPr>
+              <a:t>/xsd/extension.xsd</a:t>
+            </a:r>
+          </a:p>
+          <a:p>
+            <a:r>
+              <a:rPr lang="en-US" sz="2000" b="1" dirty="0">
+                <a:latin typeface="Courier New" panose="02070309020205020404" pitchFamily="49" charset="0"/>
+                <a:cs typeface="Courier New" panose="02070309020205020404" pitchFamily="49" charset="0"/>
+              </a:rPr>
+              <a:t>@</a:t>
+            </a:r>
+            <a:r>
+              <a:rPr lang="en-US" sz="2000" b="1" dirty="0" err="1">
+                <a:latin typeface="Courier New" panose="02070309020205020404" pitchFamily="49" charset="0"/>
+                <a:cs typeface="Courier New" panose="02070309020205020404" pitchFamily="49" charset="0"/>
+              </a:rPr>
+              <a:t>schemaLocation</a:t>
+            </a:r>
+            <a:r>
+              <a:rPr lang="en-US" sz="2000" b="1" dirty="0">
+                <a:latin typeface="Courier New" panose="02070309020205020404" pitchFamily="49" charset="0"/>
+                <a:cs typeface="Courier New" panose="02070309020205020404" pitchFamily="49" charset="0"/>
+              </a:rPr>
+              <a:t> </a:t>
+            </a:r>
+            <a:r>
+              <a:rPr lang="en-US" dirty="0"/>
+              <a:t>based, (by default) rather than XML Catalog</a:t>
             </a:r>
           </a:p>
         </p:txBody>
@@ -5257,7 +5597,7 @@
           <p:cNvPr id="3" name="Slide Number Placeholder 2">
             <a:extLst>
               <a:ext uri="{FF2B5EF4-FFF2-40B4-BE49-F238E27FC236}">
-                <a16:creationId xmlns:a16="http://schemas.microsoft.com/office/drawing/2014/main" id="{ADF6F707-07CC-4BD8-9779-719899F3153E}"/>
+                <a16:creationId xmlns:a16="http://schemas.microsoft.com/office/drawing/2014/main" id="{262E3C6B-AC00-43E7-A6F2-B7154DACC154}"/>
               </a:ext>
             </a:extLst>
           </p:cNvPr>
@@ -5281,62 +5621,10 @@
           </a:p>
         </p:txBody>
       </p:sp>
-      <p:sp>
-        <p:nvSpPr>
-          <p:cNvPr id="4" name="Text Placeholder 3">
-            <a:extLst>
-              <a:ext uri="{FF2B5EF4-FFF2-40B4-BE49-F238E27FC236}">
-                <a16:creationId xmlns:a16="http://schemas.microsoft.com/office/drawing/2014/main" id="{FE003318-BA68-4E8B-B038-B7CAA0DB11BA}"/>
-              </a:ext>
-            </a:extLst>
-          </p:cNvPr>
-          <p:cNvSpPr>
-            <a:spLocks noGrp="1"/>
-          </p:cNvSpPr>
-          <p:nvPr>
-            <p:ph type="body" idx="4294967295"/>
-          </p:nvPr>
-        </p:nvSpPr>
-        <p:spPr>
-          <a:xfrm>
-            <a:off x="213756" y="1260625"/>
-            <a:ext cx="11780322" cy="5330296"/>
-          </a:xfrm>
-        </p:spPr>
-        <p:txBody>
-          <a:bodyPr/>
-          <a:lstStyle/>
-          <a:p>
-            <a:r>
-              <a:rPr lang="en-US" dirty="0"/>
-              <a:t>Identified gaps – need effort and funding</a:t>
-            </a:r>
-          </a:p>
-          <a:p>
-            <a:pPr lvl="1"/>
-            <a:r>
-              <a:rPr lang="en-US" dirty="0"/>
-              <a:t>Metamodel, code lists, rules specification, extensions</a:t>
-            </a:r>
-          </a:p>
-          <a:p>
-            <a:r>
-              <a:rPr lang="en-US" dirty="0"/>
-              <a:t>Saw demo of portal to integrate tools into an integrated workflow and modern user experience</a:t>
-            </a:r>
-          </a:p>
-          <a:p>
-            <a:r>
-              <a:rPr lang="en-US" dirty="0"/>
-              <a:t>Reviewing courses of actions and requirements being considered by NMO to make recommendations</a:t>
-            </a:r>
-          </a:p>
-        </p:txBody>
-      </p:sp>
     </p:spTree>
     <p:extLst>
       <p:ext uri="{BB962C8B-B14F-4D97-AF65-F5344CB8AC3E}">
-        <p14:creationId xmlns:p14="http://schemas.microsoft.com/office/powerpoint/2010/main" val="2274407895"/>
+        <p14:creationId xmlns:p14="http://schemas.microsoft.com/office/powerpoint/2010/main" val="3256467494"/>
       </p:ext>
     </p:extLst>
   </p:cSld>
@@ -5368,6 +5656,145 @@
           <p:cNvPr id="2" name="Title 1">
             <a:extLst>
               <a:ext uri="{FF2B5EF4-FFF2-40B4-BE49-F238E27FC236}">
+                <a16:creationId xmlns:a16="http://schemas.microsoft.com/office/drawing/2014/main" id="{036DE374-984E-4916-B7D1-14E90E72A9C0}"/>
+              </a:ext>
+            </a:extLst>
+          </p:cNvPr>
+          <p:cNvSpPr>
+            <a:spLocks noGrp="1"/>
+          </p:cNvSpPr>
+          <p:nvPr>
+            <p:ph type="title"/>
+          </p:nvPr>
+        </p:nvSpPr>
+        <p:spPr/>
+        <p:txBody>
+          <a:bodyPr/>
+          <a:lstStyle/>
+          <a:p>
+            <a:r>
+              <a:rPr lang="en-US" dirty="0"/>
+              <a:t>Tools</a:t>
+            </a:r>
+          </a:p>
+        </p:txBody>
+      </p:sp>
+      <p:sp>
+        <p:nvSpPr>
+          <p:cNvPr id="3" name="Slide Number Placeholder 2">
+            <a:extLst>
+              <a:ext uri="{FF2B5EF4-FFF2-40B4-BE49-F238E27FC236}">
+                <a16:creationId xmlns:a16="http://schemas.microsoft.com/office/drawing/2014/main" id="{ADF6F707-07CC-4BD8-9779-719899F3153E}"/>
+              </a:ext>
+            </a:extLst>
+          </p:cNvPr>
+          <p:cNvSpPr>
+            <a:spLocks noGrp="1"/>
+          </p:cNvSpPr>
+          <p:nvPr>
+            <p:ph type="sldNum" sz="quarter" idx="12"/>
+          </p:nvPr>
+        </p:nvSpPr>
+        <p:spPr/>
+        <p:txBody>
+          <a:bodyPr/>
+          <a:lstStyle/>
+          <a:p>
+            <a:fld id="{D9011FF2-DFD3-6445-BBA2-CB95B68222FB}" type="slidenum">
+              <a:rPr lang="en-US" smtClean="0"/>
+              <a:t>6</a:t>
+            </a:fld>
+            <a:endParaRPr lang="en-US"/>
+          </a:p>
+        </p:txBody>
+      </p:sp>
+      <p:sp>
+        <p:nvSpPr>
+          <p:cNvPr id="4" name="Text Placeholder 3">
+            <a:extLst>
+              <a:ext uri="{FF2B5EF4-FFF2-40B4-BE49-F238E27FC236}">
+                <a16:creationId xmlns:a16="http://schemas.microsoft.com/office/drawing/2014/main" id="{FE003318-BA68-4E8B-B038-B7CAA0DB11BA}"/>
+              </a:ext>
+            </a:extLst>
+          </p:cNvPr>
+          <p:cNvSpPr>
+            <a:spLocks noGrp="1"/>
+          </p:cNvSpPr>
+          <p:nvPr>
+            <p:ph type="body" idx="4294967295"/>
+          </p:nvPr>
+        </p:nvSpPr>
+        <p:spPr>
+          <a:xfrm>
+            <a:off x="213756" y="1260625"/>
+            <a:ext cx="11780322" cy="5330296"/>
+          </a:xfrm>
+        </p:spPr>
+        <p:txBody>
+          <a:bodyPr/>
+          <a:lstStyle/>
+          <a:p>
+            <a:r>
+              <a:rPr lang="en-US" dirty="0"/>
+              <a:t>Identified gaps – need effort and funding</a:t>
+            </a:r>
+          </a:p>
+          <a:p>
+            <a:pPr lvl="1"/>
+            <a:r>
+              <a:rPr lang="en-US" dirty="0"/>
+              <a:t>Metamodel, code lists, rules specification, extensions</a:t>
+            </a:r>
+          </a:p>
+          <a:p>
+            <a:r>
+              <a:rPr lang="en-US" dirty="0"/>
+              <a:t>Saw demo of portal to integrate tools into an integrated workflow and modern user experience</a:t>
+            </a:r>
+          </a:p>
+          <a:p>
+            <a:r>
+              <a:rPr lang="en-US" dirty="0"/>
+              <a:t>Reviewing courses of actions and requirements being considered by NMO to make recommendations</a:t>
+            </a:r>
+          </a:p>
+        </p:txBody>
+      </p:sp>
+    </p:spTree>
+    <p:extLst>
+      <p:ext uri="{BB962C8B-B14F-4D97-AF65-F5344CB8AC3E}">
+        <p14:creationId xmlns:p14="http://schemas.microsoft.com/office/powerpoint/2010/main" val="2274407895"/>
+      </p:ext>
+    </p:extLst>
+  </p:cSld>
+  <p:clrMapOvr>
+    <a:masterClrMapping/>
+  </p:clrMapOvr>
+</p:sld>
+</file>
+
+<file path=ppt/slides/slide7.xml><?xml version="1.0" encoding="utf-8"?>
+<p:sld xmlns:a="http://schemas.openxmlformats.org/drawingml/2006/main" xmlns:r="http://schemas.openxmlformats.org/officeDocument/2006/relationships" xmlns:p="http://schemas.openxmlformats.org/presentationml/2006/main">
+  <p:cSld>
+    <p:spTree>
+      <p:nvGrpSpPr>
+        <p:cNvPr id="1" name=""/>
+        <p:cNvGrpSpPr/>
+        <p:nvPr/>
+      </p:nvGrpSpPr>
+      <p:grpSpPr>
+        <a:xfrm>
+          <a:off x="0" y="0"/>
+          <a:ext cx="0" cy="0"/>
+          <a:chOff x="0" y="0"/>
+          <a:chExt cx="0" cy="0"/>
+        </a:xfrm>
+      </p:grpSpPr>
+      <p:sp>
+        <p:nvSpPr>
+          <p:cNvPr id="2" name="Title 1">
+            <a:extLst>
+              <a:ext uri="{FF2B5EF4-FFF2-40B4-BE49-F238E27FC236}">
                 <a16:creationId xmlns:a16="http://schemas.microsoft.com/office/drawing/2014/main" id="{F2F011A3-BF2A-44EE-AF81-26800DBC0265}"/>
               </a:ext>
             </a:extLst>
@@ -5414,7 +5841,7 @@
           <a:p>
             <a:fld id="{D9011FF2-DFD3-6445-BBA2-CB95B68222FB}" type="slidenum">
               <a:rPr lang="en-US" smtClean="0"/>
-              <a:t>6</a:t>
+              <a:t>7</a:t>
             </a:fld>
             <a:endParaRPr lang="en-US"/>
           </a:p>
@@ -6911,7 +7338,7 @@
 </p:sld>
 </file>
 
-<file path=ppt/slides/slide7.xml><?xml version="1.0" encoding="utf-8"?>
+<file path=ppt/slides/slide8.xml><?xml version="1.0" encoding="utf-8"?>
 <p:sld xmlns:a="http://schemas.openxmlformats.org/drawingml/2006/main" xmlns:r="http://schemas.openxmlformats.org/officeDocument/2006/relationships" xmlns:p="http://schemas.openxmlformats.org/presentationml/2006/main">
   <p:cSld>
     <p:spTree>
@@ -6979,7 +7406,7 @@
           <a:p>
             <a:fld id="{D9011FF2-DFD3-6445-BBA2-CB95B68222FB}" type="slidenum">
               <a:rPr lang="en-US" smtClean="0"/>
-              <a:t>7</a:t>
+              <a:t>8</a:t>
             </a:fld>
             <a:endParaRPr lang="en-US"/>
           </a:p>
@@ -8681,7 +9108,7 @@
 </p:sld>
 </file>
 
-<file path=ppt/slides/slide8.xml><?xml version="1.0" encoding="utf-8"?>
+<file path=ppt/slides/slide9.xml><?xml version="1.0" encoding="utf-8"?>
 <p:sld xmlns:a="http://schemas.openxmlformats.org/drawingml/2006/main" xmlns:r="http://schemas.openxmlformats.org/officeDocument/2006/relationships" xmlns:p="http://schemas.openxmlformats.org/presentationml/2006/main">
   <p:cSld>
     <p:spTree>
@@ -8754,7 +9181,7 @@
           <a:p>
             <a:fld id="{D9011FF2-DFD3-6445-BBA2-CB95B68222FB}" type="slidenum">
               <a:rPr lang="en-US" smtClean="0"/>
-              <a:t>8</a:t>
+              <a:t>9</a:t>
             </a:fld>
             <a:endParaRPr lang="en-US"/>
           </a:p>
@@ -9892,225 +10319,6 @@
     <p:extLst>
       <p:ext uri="{BB962C8B-B14F-4D97-AF65-F5344CB8AC3E}">
         <p14:creationId xmlns:p14="http://schemas.microsoft.com/office/powerpoint/2010/main" val="955057493"/>
-      </p:ext>
-    </p:extLst>
-  </p:cSld>
-  <p:clrMapOvr>
-    <a:masterClrMapping/>
-  </p:clrMapOvr>
-</p:sld>
-</file>
-
-<file path=ppt/slides/slide9.xml><?xml version="1.0" encoding="utf-8"?>
-<p:sld xmlns:a="http://schemas.openxmlformats.org/drawingml/2006/main" xmlns:r="http://schemas.openxmlformats.org/officeDocument/2006/relationships" xmlns:p="http://schemas.openxmlformats.org/presentationml/2006/main">
-  <p:cSld>
-    <p:spTree>
-      <p:nvGrpSpPr>
-        <p:cNvPr id="1" name=""/>
-        <p:cNvGrpSpPr/>
-        <p:nvPr/>
-      </p:nvGrpSpPr>
-      <p:grpSpPr>
-        <a:xfrm>
-          <a:off x="0" y="0"/>
-          <a:ext cx="0" cy="0"/>
-          <a:chOff x="0" y="0"/>
-          <a:chExt cx="0" cy="0"/>
-        </a:xfrm>
-      </p:grpSpPr>
-      <p:sp>
-        <p:nvSpPr>
-          <p:cNvPr id="2" name="Title 1">
-            <a:extLst>
-              <a:ext uri="{FF2B5EF4-FFF2-40B4-BE49-F238E27FC236}">
-                <a16:creationId xmlns:a16="http://schemas.microsoft.com/office/drawing/2014/main" id="{3CFEFFB5-E2DC-4CBF-9EF5-1ABAC30E3E1B}"/>
-              </a:ext>
-            </a:extLst>
-          </p:cNvPr>
-          <p:cNvSpPr>
-            <a:spLocks noGrp="1"/>
-          </p:cNvSpPr>
-          <p:nvPr>
-            <p:ph type="title"/>
-          </p:nvPr>
-        </p:nvSpPr>
-        <p:spPr/>
-        <p:txBody>
-          <a:bodyPr/>
-          <a:lstStyle/>
-          <a:p>
-            <a:r>
-              <a:rPr lang="en-US" dirty="0"/>
-              <a:t>NIEM models</a:t>
-            </a:r>
-          </a:p>
-        </p:txBody>
-      </p:sp>
-      <p:sp>
-        <p:nvSpPr>
-          <p:cNvPr id="3" name="Slide Number Placeholder 2">
-            <a:extLst>
-              <a:ext uri="{FF2B5EF4-FFF2-40B4-BE49-F238E27FC236}">
-                <a16:creationId xmlns:a16="http://schemas.microsoft.com/office/drawing/2014/main" id="{4CCC5493-7930-4174-A6FD-56225EDF1130}"/>
-              </a:ext>
-            </a:extLst>
-          </p:cNvPr>
-          <p:cNvSpPr>
-            <a:spLocks noGrp="1"/>
-          </p:cNvSpPr>
-          <p:nvPr>
-            <p:ph type="sldNum" sz="quarter" idx="12"/>
-          </p:nvPr>
-        </p:nvSpPr>
-        <p:spPr/>
-        <p:txBody>
-          <a:bodyPr/>
-          <a:lstStyle/>
-          <a:p>
-            <a:fld id="{D9011FF2-DFD3-6445-BBA2-CB95B68222FB}" type="slidenum">
-              <a:rPr lang="en-US" smtClean="0"/>
-              <a:t>9</a:t>
-            </a:fld>
-            <a:endParaRPr lang="en-US"/>
-          </a:p>
-        </p:txBody>
-      </p:sp>
-      <p:sp>
-        <p:nvSpPr>
-          <p:cNvPr id="4" name="Text Placeholder 3">
-            <a:extLst>
-              <a:ext uri="{FF2B5EF4-FFF2-40B4-BE49-F238E27FC236}">
-                <a16:creationId xmlns:a16="http://schemas.microsoft.com/office/drawing/2014/main" id="{FDC0569A-C340-4AC1-ADA6-F9A19389591B}"/>
-              </a:ext>
-            </a:extLst>
-          </p:cNvPr>
-          <p:cNvSpPr>
-            <a:spLocks noGrp="1"/>
-          </p:cNvSpPr>
-          <p:nvPr>
-            <p:ph type="body" idx="4294967295"/>
-          </p:nvPr>
-        </p:nvSpPr>
-        <p:spPr>
-          <a:xfrm>
-            <a:off x="213756" y="1258784"/>
-            <a:ext cx="11780322" cy="5330296"/>
-          </a:xfrm>
-        </p:spPr>
-        <p:txBody>
-          <a:bodyPr>
-            <a:normAutofit lnSpcReduction="10000"/>
-          </a:bodyPr>
-          <a:lstStyle/>
-          <a:p>
-            <a:pPr rtl="0" eaLnBrk="1" latinLnBrk="0" hangingPunct="1"/>
-            <a:r>
-              <a:rPr lang="en-US" sz="2800" kern="1200" dirty="0">
-                <a:solidFill>
-                  <a:schemeClr val="tx1"/>
-                </a:solidFill>
-                <a:effectLst/>
-                <a:latin typeface="+mn-lt"/>
-                <a:ea typeface="+mn-ea"/>
-                <a:cs typeface="+mn-cs"/>
-              </a:rPr>
-              <a:t>Goals</a:t>
-            </a:r>
-          </a:p>
-          <a:p>
-            <a:pPr lvl="1"/>
-            <a:r>
-              <a:rPr lang="en-US" kern="1200" dirty="0">
-                <a:solidFill>
-                  <a:schemeClr val="tx1"/>
-                </a:solidFill>
-                <a:effectLst/>
-                <a:latin typeface="+mn-lt"/>
-                <a:ea typeface="+mn-ea"/>
-                <a:cs typeface="+mn-cs"/>
-              </a:rPr>
-              <a:t>Get to OpenAPI/JSON capabilities – not just an academic exercise</a:t>
-            </a:r>
-            <a:endParaRPr lang="en-US" dirty="0">
-              <a:effectLst/>
-            </a:endParaRPr>
-          </a:p>
-          <a:p>
-            <a:pPr lvl="1"/>
-            <a:r>
-              <a:rPr lang="en-US" kern="1200" dirty="0">
-                <a:solidFill>
-                  <a:schemeClr val="tx1"/>
-                </a:solidFill>
-                <a:effectLst/>
-                <a:latin typeface="+mn-lt"/>
-                <a:ea typeface="+mn-ea"/>
-                <a:cs typeface="+mn-cs"/>
-              </a:rPr>
-              <a:t>At the center of an interoperable tool strategy</a:t>
-            </a:r>
-          </a:p>
-          <a:p>
-            <a:pPr lvl="1"/>
-            <a:r>
-              <a:rPr lang="en-US" dirty="0">
-                <a:effectLst/>
-              </a:rPr>
-              <a:t>Improve automation</a:t>
-            </a:r>
-          </a:p>
-          <a:p>
-            <a:r>
-              <a:rPr lang="en-US" dirty="0"/>
-              <a:t>NTAC is developing a representation for NIEM models represented as NIEM data</a:t>
-            </a:r>
-          </a:p>
-          <a:p>
-            <a:pPr lvl="1"/>
-            <a:r>
-              <a:rPr lang="en-US" dirty="0"/>
-              <a:t>A NIEM model could be XML, JSON, or possibly other future formats</a:t>
-            </a:r>
-          </a:p>
-          <a:p>
-            <a:r>
-              <a:rPr lang="en-US" dirty="0"/>
-              <a:t>NIEM models would be transformed into conformant XML schema, JSON schema, UML, documentation, etc.</a:t>
-            </a:r>
-          </a:p>
-          <a:p>
-            <a:pPr lvl="1"/>
-            <a:r>
-              <a:rPr lang="en-US" dirty="0"/>
-              <a:t>A model is more abstract than XML schema</a:t>
-            </a:r>
-          </a:p>
-          <a:p>
-            <a:pPr lvl="1"/>
-            <a:r>
-              <a:rPr lang="en-US" dirty="0"/>
-              <a:t>That abstract form in then transformed into XML schema, JSON, or whatever you need</a:t>
-            </a:r>
-          </a:p>
-          <a:p>
-            <a:r>
-              <a:rPr lang="en-US" dirty="0"/>
-              <a:t>There is an infrastructure piece that lets all this work – that’s the “metamodel”</a:t>
-            </a:r>
-          </a:p>
-          <a:p>
-            <a:pPr lvl="1"/>
-            <a:r>
-              <a:rPr lang="en-US" dirty="0"/>
-              <a:t>A “metamodel” is a model for models</a:t>
-            </a:r>
-          </a:p>
-        </p:txBody>
-      </p:sp>
-    </p:spTree>
-    <p:extLst>
-      <p:ext uri="{BB962C8B-B14F-4D97-AF65-F5344CB8AC3E}">
-        <p14:creationId xmlns:p14="http://schemas.microsoft.com/office/powerpoint/2010/main" val="3278332417"/>
       </p:ext>
     </p:extLst>
   </p:cSld>

</xml_diff>